<commit_message>
Modified CNPM.pptx and Motayeucau.docx
</commit_message>
<xml_diff>
--- a/CNPM.pptx
+++ b/CNPM.pptx
@@ -7941,10 +7941,10 @@
       </p:sp>
       <p:pic>
         <p:nvPicPr>
-          <p:cNvPr id="4" name="Picture 3">
+          <p:cNvPr id="5" name="Picture 4" descr="Diagram&#10;&#10;Description automatically generated">
             <a:extLst>
               <a:ext uri="{FF2B5EF4-FFF2-40B4-BE49-F238E27FC236}">
-                <a16:creationId xmlns:a16="http://schemas.microsoft.com/office/drawing/2014/main" id="{B235E18F-5BE2-4EAC-A961-EDB1CC7A77D3}"/>
+                <a16:creationId xmlns:a16="http://schemas.microsoft.com/office/drawing/2014/main" id="{B1C45841-67FB-49D5-A161-644A2676EA14}"/>
               </a:ext>
             </a:extLst>
           </p:cNvPr>
@@ -7967,7 +7967,7 @@
         </p:blipFill>
         <p:spPr>
           <a:xfrm>
-            <a:off x="5572198" y="0"/>
+            <a:off x="5953358" y="0"/>
             <a:ext cx="4421856" cy="6858000"/>
           </a:xfrm>
           <a:prstGeom prst="rect">

</xml_diff>

<commit_message>
update file powerpoint and word
</commit_message>
<xml_diff>
--- a/CNPM.pptx
+++ b/CNPM.pptx
@@ -5,7 +5,7 @@
     <p:sldMasterId id="2147483672" r:id="rId1"/>
   </p:sldMasterIdLst>
   <p:notesMasterIdLst>
-    <p:notesMasterId r:id="rId21"/>
+    <p:notesMasterId r:id="rId31"/>
   </p:notesMasterIdLst>
   <p:sldIdLst>
     <p:sldId id="256" r:id="rId2"/>
@@ -20,13 +20,23 @@
     <p:sldId id="266" r:id="rId11"/>
     <p:sldId id="267" r:id="rId12"/>
     <p:sldId id="269" r:id="rId13"/>
-    <p:sldId id="270" r:id="rId14"/>
-    <p:sldId id="272" r:id="rId15"/>
-    <p:sldId id="273" r:id="rId16"/>
-    <p:sldId id="274" r:id="rId17"/>
-    <p:sldId id="275" r:id="rId18"/>
-    <p:sldId id="276" r:id="rId19"/>
-    <p:sldId id="277" r:id="rId20"/>
+    <p:sldId id="279" r:id="rId14"/>
+    <p:sldId id="270" r:id="rId15"/>
+    <p:sldId id="280" r:id="rId16"/>
+    <p:sldId id="278" r:id="rId17"/>
+    <p:sldId id="281" r:id="rId18"/>
+    <p:sldId id="282" r:id="rId19"/>
+    <p:sldId id="283" r:id="rId20"/>
+    <p:sldId id="272" r:id="rId21"/>
+    <p:sldId id="284" r:id="rId22"/>
+    <p:sldId id="285" r:id="rId23"/>
+    <p:sldId id="286" r:id="rId24"/>
+    <p:sldId id="287" r:id="rId25"/>
+    <p:sldId id="273" r:id="rId26"/>
+    <p:sldId id="274" r:id="rId27"/>
+    <p:sldId id="275" r:id="rId28"/>
+    <p:sldId id="276" r:id="rId29"/>
+    <p:sldId id="277" r:id="rId30"/>
   </p:sldIdLst>
   <p:sldSz cx="12192000" cy="6858000"/>
   <p:notesSz cx="6858000" cy="9144000"/>
@@ -4041,7 +4051,7 @@
           <a:p>
             <a:fld id="{B692C1E4-8D4F-4F13-A11D-B2F8E248C75F}" type="datetimeFigureOut">
               <a:rPr lang="en-US" smtClean="0"/>
-              <a:t>6/19/2021</a:t>
+              <a:t>6/26/2021</a:t>
             </a:fld>
             <a:endParaRPr lang="en-US"/>
           </a:p>
@@ -4436,10 +4446,7 @@
           <a:bodyPr/>
           <a:lstStyle/>
           <a:p>
-            <a:r>
-              <a:rPr lang="en-US"/>
-              <a:t> 	</a:t>
-            </a:r>
+            <a:endParaRPr lang="en-US"/>
           </a:p>
         </p:txBody>
       </p:sp>
@@ -4460,7 +4467,7 @@
           <a:p>
             <a:fld id="{166BE8A9-1332-43C3-9C65-C26D4AF875E6}" type="slidenum">
               <a:rPr lang="en-US" smtClean="0"/>
-              <a:t>16</a:t>
+              <a:t>18</a:t>
             </a:fld>
             <a:endParaRPr lang="en-US"/>
           </a:p>
@@ -4469,7 +4476,7 @@
     </p:spTree>
     <p:extLst>
       <p:ext uri="{BB962C8B-B14F-4D97-AF65-F5344CB8AC3E}">
-        <p14:creationId xmlns:p14="http://schemas.microsoft.com/office/powerpoint/2010/main" val="2955633292"/>
+        <p14:creationId xmlns:p14="http://schemas.microsoft.com/office/powerpoint/2010/main" val="2915572047"/>
       </p:ext>
     </p:extLst>
   </p:cSld>
@@ -4523,10 +4530,7 @@
           <a:bodyPr/>
           <a:lstStyle/>
           <a:p>
-            <a:r>
-              <a:rPr lang="en-US"/>
-              <a:t> 	</a:t>
-            </a:r>
+            <a:endParaRPr lang="en-US"/>
           </a:p>
         </p:txBody>
       </p:sp>
@@ -4547,7 +4551,7 @@
           <a:p>
             <a:fld id="{166BE8A9-1332-43C3-9C65-C26D4AF875E6}" type="slidenum">
               <a:rPr lang="en-US" smtClean="0"/>
-              <a:t>17</a:t>
+              <a:t>19</a:t>
             </a:fld>
             <a:endParaRPr lang="en-US"/>
           </a:p>
@@ -4556,7 +4560,7 @@
     </p:spTree>
     <p:extLst>
       <p:ext uri="{BB962C8B-B14F-4D97-AF65-F5344CB8AC3E}">
-        <p14:creationId xmlns:p14="http://schemas.microsoft.com/office/powerpoint/2010/main" val="565211193"/>
+        <p14:creationId xmlns:p14="http://schemas.microsoft.com/office/powerpoint/2010/main" val="24994863"/>
       </p:ext>
     </p:extLst>
   </p:cSld>
@@ -4610,10 +4614,7 @@
           <a:bodyPr/>
           <a:lstStyle/>
           <a:p>
-            <a:r>
-              <a:rPr lang="en-US"/>
-              <a:t> 	</a:t>
-            </a:r>
+            <a:endParaRPr lang="en-US"/>
           </a:p>
         </p:txBody>
       </p:sp>
@@ -4634,7 +4635,7 @@
           <a:p>
             <a:fld id="{166BE8A9-1332-43C3-9C65-C26D4AF875E6}" type="slidenum">
               <a:rPr lang="en-US" smtClean="0"/>
-              <a:t>18</a:t>
+              <a:t>21</a:t>
             </a:fld>
             <a:endParaRPr lang="en-US"/>
           </a:p>
@@ -4643,7 +4644,7 @@
     </p:spTree>
     <p:extLst>
       <p:ext uri="{BB962C8B-B14F-4D97-AF65-F5344CB8AC3E}">
-        <p14:creationId xmlns:p14="http://schemas.microsoft.com/office/powerpoint/2010/main" val="2293103747"/>
+        <p14:creationId xmlns:p14="http://schemas.microsoft.com/office/powerpoint/2010/main" val="630945857"/>
       </p:ext>
     </p:extLst>
   </p:cSld>
@@ -4697,10 +4698,7 @@
           <a:bodyPr/>
           <a:lstStyle/>
           <a:p>
-            <a:r>
-              <a:rPr lang="en-US"/>
-              <a:t> 	</a:t>
-            </a:r>
+            <a:endParaRPr lang="en-US"/>
           </a:p>
         </p:txBody>
       </p:sp>
@@ -4721,7 +4719,7 @@
           <a:p>
             <a:fld id="{166BE8A9-1332-43C3-9C65-C26D4AF875E6}" type="slidenum">
               <a:rPr lang="en-US" smtClean="0"/>
-              <a:t>19</a:t>
+              <a:t>22</a:t>
             </a:fld>
             <a:endParaRPr lang="en-US"/>
           </a:p>
@@ -4730,7 +4728,523 @@
     </p:spTree>
     <p:extLst>
       <p:ext uri="{BB962C8B-B14F-4D97-AF65-F5344CB8AC3E}">
-        <p14:creationId xmlns:p14="http://schemas.microsoft.com/office/powerpoint/2010/main" val="94299847"/>
+        <p14:creationId xmlns:p14="http://schemas.microsoft.com/office/powerpoint/2010/main" val="3920445102"/>
+      </p:ext>
+    </p:extLst>
+  </p:cSld>
+  <p:clrMapOvr>
+    <a:masterClrMapping/>
+  </p:clrMapOvr>
+</p:notes>
+</file>
+
+<file path=ppt/notesSlides/notesSlide14.xml><?xml version="1.0" encoding="utf-8"?>
+<p:notes xmlns:a="http://schemas.openxmlformats.org/drawingml/2006/main" xmlns:r="http://schemas.openxmlformats.org/officeDocument/2006/relationships" xmlns:p="http://schemas.openxmlformats.org/presentationml/2006/main">
+  <p:cSld>
+    <p:spTree>
+      <p:nvGrpSpPr>
+        <p:cNvPr id="1" name=""/>
+        <p:cNvGrpSpPr/>
+        <p:nvPr/>
+      </p:nvGrpSpPr>
+      <p:grpSpPr>
+        <a:xfrm>
+          <a:off x="0" y="0"/>
+          <a:ext cx="0" cy="0"/>
+          <a:chOff x="0" y="0"/>
+          <a:chExt cx="0" cy="0"/>
+        </a:xfrm>
+      </p:grpSpPr>
+      <p:sp>
+        <p:nvSpPr>
+          <p:cNvPr id="2" name="Slide Image Placeholder 1"/>
+          <p:cNvSpPr>
+            <a:spLocks noGrp="1" noRot="1" noChangeAspect="1"/>
+          </p:cNvSpPr>
+          <p:nvPr>
+            <p:ph type="sldImg"/>
+          </p:nvPr>
+        </p:nvSpPr>
+        <p:spPr/>
+      </p:sp>
+      <p:sp>
+        <p:nvSpPr>
+          <p:cNvPr id="3" name="Notes Placeholder 2"/>
+          <p:cNvSpPr>
+            <a:spLocks noGrp="1"/>
+          </p:cNvSpPr>
+          <p:nvPr>
+            <p:ph type="body" idx="1"/>
+          </p:nvPr>
+        </p:nvSpPr>
+        <p:spPr/>
+        <p:txBody>
+          <a:bodyPr/>
+          <a:lstStyle/>
+          <a:p>
+            <a:endParaRPr lang="en-US"/>
+          </a:p>
+        </p:txBody>
+      </p:sp>
+      <p:sp>
+        <p:nvSpPr>
+          <p:cNvPr id="4" name="Slide Number Placeholder 3"/>
+          <p:cNvSpPr>
+            <a:spLocks noGrp="1"/>
+          </p:cNvSpPr>
+          <p:nvPr>
+            <p:ph type="sldNum" sz="quarter" idx="5"/>
+          </p:nvPr>
+        </p:nvSpPr>
+        <p:spPr/>
+        <p:txBody>
+          <a:bodyPr/>
+          <a:lstStyle/>
+          <a:p>
+            <a:fld id="{166BE8A9-1332-43C3-9C65-C26D4AF875E6}" type="slidenum">
+              <a:rPr lang="en-US" smtClean="0"/>
+              <a:t>23</a:t>
+            </a:fld>
+            <a:endParaRPr lang="en-US"/>
+          </a:p>
+        </p:txBody>
+      </p:sp>
+    </p:spTree>
+    <p:extLst>
+      <p:ext uri="{BB962C8B-B14F-4D97-AF65-F5344CB8AC3E}">
+        <p14:creationId xmlns:p14="http://schemas.microsoft.com/office/powerpoint/2010/main" val="3725086258"/>
+      </p:ext>
+    </p:extLst>
+  </p:cSld>
+  <p:clrMapOvr>
+    <a:masterClrMapping/>
+  </p:clrMapOvr>
+</p:notes>
+</file>
+
+<file path=ppt/notesSlides/notesSlide15.xml><?xml version="1.0" encoding="utf-8"?>
+<p:notes xmlns:a="http://schemas.openxmlformats.org/drawingml/2006/main" xmlns:r="http://schemas.openxmlformats.org/officeDocument/2006/relationships" xmlns:p="http://schemas.openxmlformats.org/presentationml/2006/main">
+  <p:cSld>
+    <p:spTree>
+      <p:nvGrpSpPr>
+        <p:cNvPr id="1" name=""/>
+        <p:cNvGrpSpPr/>
+        <p:nvPr/>
+      </p:nvGrpSpPr>
+      <p:grpSpPr>
+        <a:xfrm>
+          <a:off x="0" y="0"/>
+          <a:ext cx="0" cy="0"/>
+          <a:chOff x="0" y="0"/>
+          <a:chExt cx="0" cy="0"/>
+        </a:xfrm>
+      </p:grpSpPr>
+      <p:sp>
+        <p:nvSpPr>
+          <p:cNvPr id="2" name="Slide Image Placeholder 1"/>
+          <p:cNvSpPr>
+            <a:spLocks noGrp="1" noRot="1" noChangeAspect="1"/>
+          </p:cNvSpPr>
+          <p:nvPr>
+            <p:ph type="sldImg"/>
+          </p:nvPr>
+        </p:nvSpPr>
+        <p:spPr/>
+      </p:sp>
+      <p:sp>
+        <p:nvSpPr>
+          <p:cNvPr id="3" name="Notes Placeholder 2"/>
+          <p:cNvSpPr>
+            <a:spLocks noGrp="1"/>
+          </p:cNvSpPr>
+          <p:nvPr>
+            <p:ph type="body" idx="1"/>
+          </p:nvPr>
+        </p:nvSpPr>
+        <p:spPr/>
+        <p:txBody>
+          <a:bodyPr/>
+          <a:lstStyle/>
+          <a:p>
+            <a:endParaRPr lang="en-US"/>
+          </a:p>
+        </p:txBody>
+      </p:sp>
+      <p:sp>
+        <p:nvSpPr>
+          <p:cNvPr id="4" name="Slide Number Placeholder 3"/>
+          <p:cNvSpPr>
+            <a:spLocks noGrp="1"/>
+          </p:cNvSpPr>
+          <p:nvPr>
+            <p:ph type="sldNum" sz="quarter" idx="5"/>
+          </p:nvPr>
+        </p:nvSpPr>
+        <p:spPr/>
+        <p:txBody>
+          <a:bodyPr/>
+          <a:lstStyle/>
+          <a:p>
+            <a:fld id="{166BE8A9-1332-43C3-9C65-C26D4AF875E6}" type="slidenum">
+              <a:rPr lang="en-US" smtClean="0"/>
+              <a:t>24</a:t>
+            </a:fld>
+            <a:endParaRPr lang="en-US"/>
+          </a:p>
+        </p:txBody>
+      </p:sp>
+    </p:spTree>
+    <p:extLst>
+      <p:ext uri="{BB962C8B-B14F-4D97-AF65-F5344CB8AC3E}">
+        <p14:creationId xmlns:p14="http://schemas.microsoft.com/office/powerpoint/2010/main" val="4255423172"/>
+      </p:ext>
+    </p:extLst>
+  </p:cSld>
+  <p:clrMapOvr>
+    <a:masterClrMapping/>
+  </p:clrMapOvr>
+</p:notes>
+</file>
+
+<file path=ppt/notesSlides/notesSlide16.xml><?xml version="1.0" encoding="utf-8"?>
+<p:notes xmlns:a="http://schemas.openxmlformats.org/drawingml/2006/main" xmlns:r="http://schemas.openxmlformats.org/officeDocument/2006/relationships" xmlns:p="http://schemas.openxmlformats.org/presentationml/2006/main">
+  <p:cSld>
+    <p:spTree>
+      <p:nvGrpSpPr>
+        <p:cNvPr id="1" name=""/>
+        <p:cNvGrpSpPr/>
+        <p:nvPr/>
+      </p:nvGrpSpPr>
+      <p:grpSpPr>
+        <a:xfrm>
+          <a:off x="0" y="0"/>
+          <a:ext cx="0" cy="0"/>
+          <a:chOff x="0" y="0"/>
+          <a:chExt cx="0" cy="0"/>
+        </a:xfrm>
+      </p:grpSpPr>
+      <p:sp>
+        <p:nvSpPr>
+          <p:cNvPr id="2" name="Slide Image Placeholder 1"/>
+          <p:cNvSpPr>
+            <a:spLocks noGrp="1" noRot="1" noChangeAspect="1"/>
+          </p:cNvSpPr>
+          <p:nvPr>
+            <p:ph type="sldImg"/>
+          </p:nvPr>
+        </p:nvSpPr>
+        <p:spPr/>
+      </p:sp>
+      <p:sp>
+        <p:nvSpPr>
+          <p:cNvPr id="3" name="Notes Placeholder 2"/>
+          <p:cNvSpPr>
+            <a:spLocks noGrp="1"/>
+          </p:cNvSpPr>
+          <p:nvPr>
+            <p:ph type="body" idx="1"/>
+          </p:nvPr>
+        </p:nvSpPr>
+        <p:spPr/>
+        <p:txBody>
+          <a:bodyPr/>
+          <a:lstStyle/>
+          <a:p>
+            <a:r>
+              <a:rPr lang="en-US"/>
+              <a:t> 	</a:t>
+            </a:r>
+          </a:p>
+        </p:txBody>
+      </p:sp>
+      <p:sp>
+        <p:nvSpPr>
+          <p:cNvPr id="4" name="Slide Number Placeholder 3"/>
+          <p:cNvSpPr>
+            <a:spLocks noGrp="1"/>
+          </p:cNvSpPr>
+          <p:nvPr>
+            <p:ph type="sldNum" sz="quarter" idx="5"/>
+          </p:nvPr>
+        </p:nvSpPr>
+        <p:spPr/>
+        <p:txBody>
+          <a:bodyPr/>
+          <a:lstStyle/>
+          <a:p>
+            <a:fld id="{166BE8A9-1332-43C3-9C65-C26D4AF875E6}" type="slidenum">
+              <a:rPr lang="en-US" smtClean="0"/>
+              <a:t>25</a:t>
+            </a:fld>
+            <a:endParaRPr lang="en-US"/>
+          </a:p>
+        </p:txBody>
+      </p:sp>
+    </p:spTree>
+    <p:extLst>
+      <p:ext uri="{BB962C8B-B14F-4D97-AF65-F5344CB8AC3E}">
+        <p14:creationId xmlns:p14="http://schemas.microsoft.com/office/powerpoint/2010/main" val="487346144"/>
+      </p:ext>
+    </p:extLst>
+  </p:cSld>
+  <p:clrMapOvr>
+    <a:masterClrMapping/>
+  </p:clrMapOvr>
+</p:notes>
+</file>
+
+<file path=ppt/notesSlides/notesSlide17.xml><?xml version="1.0" encoding="utf-8"?>
+<p:notes xmlns:a="http://schemas.openxmlformats.org/drawingml/2006/main" xmlns:r="http://schemas.openxmlformats.org/officeDocument/2006/relationships" xmlns:p="http://schemas.openxmlformats.org/presentationml/2006/main">
+  <p:cSld>
+    <p:spTree>
+      <p:nvGrpSpPr>
+        <p:cNvPr id="1" name=""/>
+        <p:cNvGrpSpPr/>
+        <p:nvPr/>
+      </p:nvGrpSpPr>
+      <p:grpSpPr>
+        <a:xfrm>
+          <a:off x="0" y="0"/>
+          <a:ext cx="0" cy="0"/>
+          <a:chOff x="0" y="0"/>
+          <a:chExt cx="0" cy="0"/>
+        </a:xfrm>
+      </p:grpSpPr>
+      <p:sp>
+        <p:nvSpPr>
+          <p:cNvPr id="2" name="Slide Image Placeholder 1"/>
+          <p:cNvSpPr>
+            <a:spLocks noGrp="1" noRot="1" noChangeAspect="1"/>
+          </p:cNvSpPr>
+          <p:nvPr>
+            <p:ph type="sldImg"/>
+          </p:nvPr>
+        </p:nvSpPr>
+        <p:spPr/>
+      </p:sp>
+      <p:sp>
+        <p:nvSpPr>
+          <p:cNvPr id="3" name="Notes Placeholder 2"/>
+          <p:cNvSpPr>
+            <a:spLocks noGrp="1"/>
+          </p:cNvSpPr>
+          <p:nvPr>
+            <p:ph type="body" idx="1"/>
+          </p:nvPr>
+        </p:nvSpPr>
+        <p:spPr/>
+        <p:txBody>
+          <a:bodyPr/>
+          <a:lstStyle/>
+          <a:p>
+            <a:r>
+              <a:rPr lang="en-US"/>
+              <a:t> 	</a:t>
+            </a:r>
+          </a:p>
+        </p:txBody>
+      </p:sp>
+      <p:sp>
+        <p:nvSpPr>
+          <p:cNvPr id="4" name="Slide Number Placeholder 3"/>
+          <p:cNvSpPr>
+            <a:spLocks noGrp="1"/>
+          </p:cNvSpPr>
+          <p:nvPr>
+            <p:ph type="sldNum" sz="quarter" idx="5"/>
+          </p:nvPr>
+        </p:nvSpPr>
+        <p:spPr/>
+        <p:txBody>
+          <a:bodyPr/>
+          <a:lstStyle/>
+          <a:p>
+            <a:fld id="{166BE8A9-1332-43C3-9C65-C26D4AF875E6}" type="slidenum">
+              <a:rPr lang="en-US" smtClean="0"/>
+              <a:t>26</a:t>
+            </a:fld>
+            <a:endParaRPr lang="en-US"/>
+          </a:p>
+        </p:txBody>
+      </p:sp>
+    </p:spTree>
+    <p:extLst>
+      <p:ext uri="{BB962C8B-B14F-4D97-AF65-F5344CB8AC3E}">
+        <p14:creationId xmlns:p14="http://schemas.microsoft.com/office/powerpoint/2010/main" val="2955633292"/>
+      </p:ext>
+    </p:extLst>
+  </p:cSld>
+  <p:clrMapOvr>
+    <a:masterClrMapping/>
+  </p:clrMapOvr>
+</p:notes>
+</file>
+
+<file path=ppt/notesSlides/notesSlide18.xml><?xml version="1.0" encoding="utf-8"?>
+<p:notes xmlns:a="http://schemas.openxmlformats.org/drawingml/2006/main" xmlns:r="http://schemas.openxmlformats.org/officeDocument/2006/relationships" xmlns:p="http://schemas.openxmlformats.org/presentationml/2006/main">
+  <p:cSld>
+    <p:spTree>
+      <p:nvGrpSpPr>
+        <p:cNvPr id="1" name=""/>
+        <p:cNvGrpSpPr/>
+        <p:nvPr/>
+      </p:nvGrpSpPr>
+      <p:grpSpPr>
+        <a:xfrm>
+          <a:off x="0" y="0"/>
+          <a:ext cx="0" cy="0"/>
+          <a:chOff x="0" y="0"/>
+          <a:chExt cx="0" cy="0"/>
+        </a:xfrm>
+      </p:grpSpPr>
+      <p:sp>
+        <p:nvSpPr>
+          <p:cNvPr id="2" name="Slide Image Placeholder 1"/>
+          <p:cNvSpPr>
+            <a:spLocks noGrp="1" noRot="1" noChangeAspect="1"/>
+          </p:cNvSpPr>
+          <p:nvPr>
+            <p:ph type="sldImg"/>
+          </p:nvPr>
+        </p:nvSpPr>
+        <p:spPr/>
+      </p:sp>
+      <p:sp>
+        <p:nvSpPr>
+          <p:cNvPr id="3" name="Notes Placeholder 2"/>
+          <p:cNvSpPr>
+            <a:spLocks noGrp="1"/>
+          </p:cNvSpPr>
+          <p:nvPr>
+            <p:ph type="body" idx="1"/>
+          </p:nvPr>
+        </p:nvSpPr>
+        <p:spPr/>
+        <p:txBody>
+          <a:bodyPr/>
+          <a:lstStyle/>
+          <a:p>
+            <a:r>
+              <a:rPr lang="en-US"/>
+              <a:t> 	</a:t>
+            </a:r>
+          </a:p>
+        </p:txBody>
+      </p:sp>
+      <p:sp>
+        <p:nvSpPr>
+          <p:cNvPr id="4" name="Slide Number Placeholder 3"/>
+          <p:cNvSpPr>
+            <a:spLocks noGrp="1"/>
+          </p:cNvSpPr>
+          <p:nvPr>
+            <p:ph type="sldNum" sz="quarter" idx="5"/>
+          </p:nvPr>
+        </p:nvSpPr>
+        <p:spPr/>
+        <p:txBody>
+          <a:bodyPr/>
+          <a:lstStyle/>
+          <a:p>
+            <a:fld id="{166BE8A9-1332-43C3-9C65-C26D4AF875E6}" type="slidenum">
+              <a:rPr lang="en-US" smtClean="0"/>
+              <a:t>27</a:t>
+            </a:fld>
+            <a:endParaRPr lang="en-US"/>
+          </a:p>
+        </p:txBody>
+      </p:sp>
+    </p:spTree>
+    <p:extLst>
+      <p:ext uri="{BB962C8B-B14F-4D97-AF65-F5344CB8AC3E}">
+        <p14:creationId xmlns:p14="http://schemas.microsoft.com/office/powerpoint/2010/main" val="565211193"/>
+      </p:ext>
+    </p:extLst>
+  </p:cSld>
+  <p:clrMapOvr>
+    <a:masterClrMapping/>
+  </p:clrMapOvr>
+</p:notes>
+</file>
+
+<file path=ppt/notesSlides/notesSlide19.xml><?xml version="1.0" encoding="utf-8"?>
+<p:notes xmlns:a="http://schemas.openxmlformats.org/drawingml/2006/main" xmlns:r="http://schemas.openxmlformats.org/officeDocument/2006/relationships" xmlns:p="http://schemas.openxmlformats.org/presentationml/2006/main">
+  <p:cSld>
+    <p:spTree>
+      <p:nvGrpSpPr>
+        <p:cNvPr id="1" name=""/>
+        <p:cNvGrpSpPr/>
+        <p:nvPr/>
+      </p:nvGrpSpPr>
+      <p:grpSpPr>
+        <a:xfrm>
+          <a:off x="0" y="0"/>
+          <a:ext cx="0" cy="0"/>
+          <a:chOff x="0" y="0"/>
+          <a:chExt cx="0" cy="0"/>
+        </a:xfrm>
+      </p:grpSpPr>
+      <p:sp>
+        <p:nvSpPr>
+          <p:cNvPr id="2" name="Slide Image Placeholder 1"/>
+          <p:cNvSpPr>
+            <a:spLocks noGrp="1" noRot="1" noChangeAspect="1"/>
+          </p:cNvSpPr>
+          <p:nvPr>
+            <p:ph type="sldImg"/>
+          </p:nvPr>
+        </p:nvSpPr>
+        <p:spPr/>
+      </p:sp>
+      <p:sp>
+        <p:nvSpPr>
+          <p:cNvPr id="3" name="Notes Placeholder 2"/>
+          <p:cNvSpPr>
+            <a:spLocks noGrp="1"/>
+          </p:cNvSpPr>
+          <p:nvPr>
+            <p:ph type="body" idx="1"/>
+          </p:nvPr>
+        </p:nvSpPr>
+        <p:spPr/>
+        <p:txBody>
+          <a:bodyPr/>
+          <a:lstStyle/>
+          <a:p>
+            <a:r>
+              <a:rPr lang="en-US"/>
+              <a:t> 	</a:t>
+            </a:r>
+          </a:p>
+        </p:txBody>
+      </p:sp>
+      <p:sp>
+        <p:nvSpPr>
+          <p:cNvPr id="4" name="Slide Number Placeholder 3"/>
+          <p:cNvSpPr>
+            <a:spLocks noGrp="1"/>
+          </p:cNvSpPr>
+          <p:nvPr>
+            <p:ph type="sldNum" sz="quarter" idx="5"/>
+          </p:nvPr>
+        </p:nvSpPr>
+        <p:spPr/>
+        <p:txBody>
+          <a:bodyPr/>
+          <a:lstStyle/>
+          <a:p>
+            <a:fld id="{166BE8A9-1332-43C3-9C65-C26D4AF875E6}" type="slidenum">
+              <a:rPr lang="en-US" smtClean="0"/>
+              <a:t>28</a:t>
+            </a:fld>
+            <a:endParaRPr lang="en-US"/>
+          </a:p>
+        </p:txBody>
+      </p:sp>
+    </p:spTree>
+    <p:extLst>
+      <p:ext uri="{BB962C8B-B14F-4D97-AF65-F5344CB8AC3E}">
+        <p14:creationId xmlns:p14="http://schemas.microsoft.com/office/powerpoint/2010/main" val="2293103747"/>
       </p:ext>
     </p:extLst>
   </p:cSld>
@@ -4824,6 +5338,93 @@
     <p:extLst>
       <p:ext uri="{BB962C8B-B14F-4D97-AF65-F5344CB8AC3E}">
         <p14:creationId xmlns:p14="http://schemas.microsoft.com/office/powerpoint/2010/main" val="3695167882"/>
+      </p:ext>
+    </p:extLst>
+  </p:cSld>
+  <p:clrMapOvr>
+    <a:masterClrMapping/>
+  </p:clrMapOvr>
+</p:notes>
+</file>
+
+<file path=ppt/notesSlides/notesSlide20.xml><?xml version="1.0" encoding="utf-8"?>
+<p:notes xmlns:a="http://schemas.openxmlformats.org/drawingml/2006/main" xmlns:r="http://schemas.openxmlformats.org/officeDocument/2006/relationships" xmlns:p="http://schemas.openxmlformats.org/presentationml/2006/main">
+  <p:cSld>
+    <p:spTree>
+      <p:nvGrpSpPr>
+        <p:cNvPr id="1" name=""/>
+        <p:cNvGrpSpPr/>
+        <p:nvPr/>
+      </p:nvGrpSpPr>
+      <p:grpSpPr>
+        <a:xfrm>
+          <a:off x="0" y="0"/>
+          <a:ext cx="0" cy="0"/>
+          <a:chOff x="0" y="0"/>
+          <a:chExt cx="0" cy="0"/>
+        </a:xfrm>
+      </p:grpSpPr>
+      <p:sp>
+        <p:nvSpPr>
+          <p:cNvPr id="2" name="Slide Image Placeholder 1"/>
+          <p:cNvSpPr>
+            <a:spLocks noGrp="1" noRot="1" noChangeAspect="1"/>
+          </p:cNvSpPr>
+          <p:nvPr>
+            <p:ph type="sldImg"/>
+          </p:nvPr>
+        </p:nvSpPr>
+        <p:spPr/>
+      </p:sp>
+      <p:sp>
+        <p:nvSpPr>
+          <p:cNvPr id="3" name="Notes Placeholder 2"/>
+          <p:cNvSpPr>
+            <a:spLocks noGrp="1"/>
+          </p:cNvSpPr>
+          <p:nvPr>
+            <p:ph type="body" idx="1"/>
+          </p:nvPr>
+        </p:nvSpPr>
+        <p:spPr/>
+        <p:txBody>
+          <a:bodyPr/>
+          <a:lstStyle/>
+          <a:p>
+            <a:r>
+              <a:rPr lang="en-US"/>
+              <a:t> 	</a:t>
+            </a:r>
+          </a:p>
+        </p:txBody>
+      </p:sp>
+      <p:sp>
+        <p:nvSpPr>
+          <p:cNvPr id="4" name="Slide Number Placeholder 3"/>
+          <p:cNvSpPr>
+            <a:spLocks noGrp="1"/>
+          </p:cNvSpPr>
+          <p:nvPr>
+            <p:ph type="sldNum" sz="quarter" idx="5"/>
+          </p:nvPr>
+        </p:nvSpPr>
+        <p:spPr/>
+        <p:txBody>
+          <a:bodyPr/>
+          <a:lstStyle/>
+          <a:p>
+            <a:fld id="{166BE8A9-1332-43C3-9C65-C26D4AF875E6}" type="slidenum">
+              <a:rPr lang="en-US" smtClean="0"/>
+              <a:t>29</a:t>
+            </a:fld>
+            <a:endParaRPr lang="en-US"/>
+          </a:p>
+        </p:txBody>
+      </p:sp>
+    </p:spTree>
+    <p:extLst>
+      <p:ext uri="{BB962C8B-B14F-4D97-AF65-F5344CB8AC3E}">
+        <p14:creationId xmlns:p14="http://schemas.microsoft.com/office/powerpoint/2010/main" val="94299847"/>
       </p:ext>
     </p:extLst>
   </p:cSld>
@@ -7218,10 +7819,690 @@
           <a:bodyPr/>
           <a:lstStyle/>
           <a:p>
-            <a:r>
-              <a:rPr lang="en-US"/>
-              <a:t> 	</a:t>
-            </a:r>
+            <a:pPr marL="457200">
+              <a:lnSpc>
+                <a:spcPct val="115000"/>
+              </a:lnSpc>
+              <a:spcAft>
+                <a:spcPts val="1000"/>
+              </a:spcAft>
+            </a:pPr>
+            <a:r>
+              <a:rPr lang="en-US" sz="1200">
+                <a:effectLst/>
+                <a:latin typeface="Times New Roman" panose="02020603050405020304" pitchFamily="18" charset="0"/>
+                <a:ea typeface="Calibri" panose="020F0502020204030204" pitchFamily="34" charset="0"/>
+              </a:rPr>
+              <a:t>Dòng sự kiện chính:</a:t>
+            </a:r>
+            <a:endParaRPr lang="en-US" sz="1800">
+              <a:effectLst/>
+              <a:latin typeface="Times New Roman" panose="02020603050405020304" pitchFamily="18" charset="0"/>
+              <a:ea typeface="Calibri" panose="020F0502020204030204" pitchFamily="34" charset="0"/>
+            </a:endParaRPr>
+          </a:p>
+          <a:p>
+            <a:pPr marL="342900" lvl="0" indent="-342900">
+              <a:lnSpc>
+                <a:spcPct val="115000"/>
+              </a:lnSpc>
+              <a:buFont typeface="Times New Roman" panose="02020603050405020304" pitchFamily="18" charset="0"/>
+              <a:buChar char="-"/>
+            </a:pPr>
+            <a:r>
+              <a:rPr lang="en-US" sz="1200">
+                <a:effectLst/>
+                <a:latin typeface="Times New Roman" panose="02020603050405020304" pitchFamily="18" charset="0"/>
+                <a:ea typeface="Calibri" panose="020F0502020204030204" pitchFamily="34" charset="0"/>
+              </a:rPr>
+              <a:t>Tại giao diện danh sách bài học, bài kiểm tra, người dùng sẽ nhấn vào bài học, bài kiểm tra.</a:t>
+            </a:r>
+            <a:endParaRPr lang="en-US" sz="1800">
+              <a:effectLst/>
+              <a:latin typeface="Times New Roman" panose="02020603050405020304" pitchFamily="18" charset="0"/>
+              <a:ea typeface="Calibri" panose="020F0502020204030204" pitchFamily="34" charset="0"/>
+            </a:endParaRPr>
+          </a:p>
+          <a:p>
+            <a:pPr marL="342900" lvl="0" indent="-342900">
+              <a:lnSpc>
+                <a:spcPct val="115000"/>
+              </a:lnSpc>
+              <a:buFont typeface="Times New Roman" panose="02020603050405020304" pitchFamily="18" charset="0"/>
+              <a:buChar char="-"/>
+            </a:pPr>
+            <a:r>
+              <a:rPr lang="en-US" sz="1200">
+                <a:effectLst/>
+                <a:latin typeface="Times New Roman" panose="02020603050405020304" pitchFamily="18" charset="0"/>
+                <a:ea typeface="Calibri" panose="020F0502020204030204" pitchFamily="34" charset="0"/>
+              </a:rPr>
+              <a:t>Từ trang danh sách sẽ gửi về cho trang LessonController một ID của bài.</a:t>
+            </a:r>
+            <a:endParaRPr lang="en-US" sz="1800">
+              <a:effectLst/>
+              <a:latin typeface="Times New Roman" panose="02020603050405020304" pitchFamily="18" charset="0"/>
+              <a:ea typeface="Calibri" panose="020F0502020204030204" pitchFamily="34" charset="0"/>
+            </a:endParaRPr>
+          </a:p>
+          <a:p>
+            <a:pPr marL="342900" lvl="0" indent="-342900">
+              <a:lnSpc>
+                <a:spcPct val="115000"/>
+              </a:lnSpc>
+              <a:buFont typeface="Times New Roman" panose="02020603050405020304" pitchFamily="18" charset="0"/>
+              <a:buChar char="-"/>
+            </a:pPr>
+            <a:r>
+              <a:rPr lang="en-US" sz="1200">
+                <a:effectLst/>
+                <a:latin typeface="Times New Roman" panose="02020603050405020304" pitchFamily="18" charset="0"/>
+                <a:ea typeface="Calibri" panose="020F0502020204030204" pitchFamily="34" charset="0"/>
+              </a:rPr>
+              <a:t>Từ LessonController sẽ gọi đến LessonService để sử dụng hàm findById(id).</a:t>
+            </a:r>
+            <a:endParaRPr lang="en-US" sz="1800">
+              <a:effectLst/>
+              <a:latin typeface="Times New Roman" panose="02020603050405020304" pitchFamily="18" charset="0"/>
+              <a:ea typeface="Calibri" panose="020F0502020204030204" pitchFamily="34" charset="0"/>
+            </a:endParaRPr>
+          </a:p>
+          <a:p>
+            <a:pPr marL="342900" lvl="0" indent="-342900">
+              <a:lnSpc>
+                <a:spcPct val="115000"/>
+              </a:lnSpc>
+              <a:buFont typeface="Times New Roman" panose="02020603050405020304" pitchFamily="18" charset="0"/>
+              <a:buChar char="-"/>
+            </a:pPr>
+            <a:r>
+              <a:rPr lang="en-US" sz="1200">
+                <a:effectLst/>
+                <a:latin typeface="Times New Roman" panose="02020603050405020304" pitchFamily="18" charset="0"/>
+                <a:ea typeface="Calibri" panose="020F0502020204030204" pitchFamily="34" charset="0"/>
+              </a:rPr>
+              <a:t>LessonService sẽ gọi đến LessonDAO để sử dụng hàm findById(id).</a:t>
+            </a:r>
+            <a:endParaRPr lang="en-US" sz="1800">
+              <a:effectLst/>
+              <a:latin typeface="Times New Roman" panose="02020603050405020304" pitchFamily="18" charset="0"/>
+              <a:ea typeface="Calibri" panose="020F0502020204030204" pitchFamily="34" charset="0"/>
+            </a:endParaRPr>
+          </a:p>
+          <a:p>
+            <a:pPr marL="342900" lvl="0" indent="-342900">
+              <a:lnSpc>
+                <a:spcPct val="115000"/>
+              </a:lnSpc>
+              <a:buFont typeface="Times New Roman" panose="02020603050405020304" pitchFamily="18" charset="0"/>
+              <a:buChar char="-"/>
+            </a:pPr>
+            <a:r>
+              <a:rPr lang="en-US" sz="1200">
+                <a:effectLst/>
+                <a:latin typeface="Times New Roman" panose="02020603050405020304" pitchFamily="18" charset="0"/>
+                <a:ea typeface="Calibri" panose="020F0502020204030204" pitchFamily="34" charset="0"/>
+              </a:rPr>
+              <a:t>Từ LessonDAO sẽ query đến DataBase để lấy về thông tin bài học theo mã ID được cung cấp từ trước.</a:t>
+            </a:r>
+            <a:endParaRPr lang="en-US" sz="1800">
+              <a:effectLst/>
+              <a:latin typeface="Times New Roman" panose="02020603050405020304" pitchFamily="18" charset="0"/>
+              <a:ea typeface="Calibri" panose="020F0502020204030204" pitchFamily="34" charset="0"/>
+            </a:endParaRPr>
+          </a:p>
+          <a:p>
+            <a:pPr marL="342900" lvl="0" indent="-342900">
+              <a:lnSpc>
+                <a:spcPct val="115000"/>
+              </a:lnSpc>
+              <a:buFont typeface="Times New Roman" panose="02020603050405020304" pitchFamily="18" charset="0"/>
+              <a:buChar char="-"/>
+            </a:pPr>
+            <a:r>
+              <a:rPr lang="en-US" sz="1200">
+                <a:effectLst/>
+                <a:latin typeface="Times New Roman" panose="02020603050405020304" pitchFamily="18" charset="0"/>
+                <a:ea typeface="Calibri" panose="020F0502020204030204" pitchFamily="34" charset="0"/>
+              </a:rPr>
+              <a:t>DataBase sẽ trả về một Lesson/Test model.</a:t>
+            </a:r>
+            <a:endParaRPr lang="en-US" sz="1800">
+              <a:effectLst/>
+              <a:latin typeface="Times New Roman" panose="02020603050405020304" pitchFamily="18" charset="0"/>
+              <a:ea typeface="Calibri" panose="020F0502020204030204" pitchFamily="34" charset="0"/>
+            </a:endParaRPr>
+          </a:p>
+          <a:p>
+            <a:pPr marL="342900" lvl="0" indent="-342900">
+              <a:lnSpc>
+                <a:spcPct val="115000"/>
+              </a:lnSpc>
+              <a:buFont typeface="Times New Roman" panose="02020603050405020304" pitchFamily="18" charset="0"/>
+              <a:buChar char="-"/>
+            </a:pPr>
+            <a:r>
+              <a:rPr lang="en-US" sz="1200">
+                <a:effectLst/>
+                <a:latin typeface="Times New Roman" panose="02020603050405020304" pitchFamily="18" charset="0"/>
+                <a:ea typeface="Calibri" panose="020F0502020204030204" pitchFamily="34" charset="0"/>
+              </a:rPr>
+              <a:t>Model sẽ được gửi về LessonDAO đếm LessonController và hiển thị thông tin lên trang chi tiết bài học/ bài kiểm tra.</a:t>
+            </a:r>
+            <a:endParaRPr lang="en-US" sz="1800">
+              <a:effectLst/>
+              <a:latin typeface="Times New Roman" panose="02020603050405020304" pitchFamily="18" charset="0"/>
+              <a:ea typeface="Calibri" panose="020F0502020204030204" pitchFamily="34" charset="0"/>
+            </a:endParaRPr>
+          </a:p>
+          <a:p>
+            <a:pPr marL="342900" lvl="0" indent="-342900">
+              <a:lnSpc>
+                <a:spcPct val="115000"/>
+              </a:lnSpc>
+              <a:buFont typeface="Times New Roman" panose="02020603050405020304" pitchFamily="18" charset="0"/>
+              <a:buChar char="-"/>
+            </a:pPr>
+            <a:r>
+              <a:rPr lang="en-US" sz="1200">
+                <a:effectLst/>
+                <a:latin typeface="Times New Roman" panose="02020603050405020304" pitchFamily="18" charset="0"/>
+                <a:ea typeface="Calibri" panose="020F0502020204030204" pitchFamily="34" charset="0"/>
+              </a:rPr>
+              <a:t>Tại trang chi tiết bài học người Admin sẽ thực hiện thao tác thay đổi các thông tin mà mình muốn thay đổi.</a:t>
+            </a:r>
+            <a:endParaRPr lang="en-US" sz="1800">
+              <a:effectLst/>
+              <a:latin typeface="Times New Roman" panose="02020603050405020304" pitchFamily="18" charset="0"/>
+              <a:ea typeface="Calibri" panose="020F0502020204030204" pitchFamily="34" charset="0"/>
+            </a:endParaRPr>
+          </a:p>
+          <a:p>
+            <a:pPr marL="342900" lvl="0" indent="-342900">
+              <a:lnSpc>
+                <a:spcPct val="115000"/>
+              </a:lnSpc>
+              <a:buFont typeface="Times New Roman" panose="02020603050405020304" pitchFamily="18" charset="0"/>
+              <a:buChar char="-"/>
+            </a:pPr>
+            <a:r>
+              <a:rPr lang="en-US" sz="1200">
+                <a:effectLst/>
+                <a:latin typeface="Times New Roman" panose="02020603050405020304" pitchFamily="18" charset="0"/>
+                <a:ea typeface="Calibri" panose="020F0502020204030204" pitchFamily="34" charset="0"/>
+              </a:rPr>
+              <a:t>Tại trang chi tiết bài học người admin thay đổi thông tin theo mong muốn của mình và nhấn vào nút lưu thay đổi.</a:t>
+            </a:r>
+            <a:endParaRPr lang="en-US" sz="1800">
+              <a:effectLst/>
+              <a:latin typeface="Times New Roman" panose="02020603050405020304" pitchFamily="18" charset="0"/>
+              <a:ea typeface="Calibri" panose="020F0502020204030204" pitchFamily="34" charset="0"/>
+            </a:endParaRPr>
+          </a:p>
+          <a:p>
+            <a:pPr marL="342900" lvl="0" indent="-342900">
+              <a:lnSpc>
+                <a:spcPct val="115000"/>
+              </a:lnSpc>
+              <a:buFont typeface="Times New Roman" panose="02020603050405020304" pitchFamily="18" charset="0"/>
+              <a:buChar char="-"/>
+            </a:pPr>
+            <a:r>
+              <a:rPr lang="en-US" sz="1200">
+                <a:effectLst/>
+                <a:latin typeface="Times New Roman" panose="02020603050405020304" pitchFamily="18" charset="0"/>
+                <a:ea typeface="Calibri" panose="020F0502020204030204" pitchFamily="34" charset="0"/>
+              </a:rPr>
+              <a:t>Nếu là bài học</a:t>
+            </a:r>
+            <a:endParaRPr lang="en-US" sz="1800">
+              <a:effectLst/>
+              <a:latin typeface="Times New Roman" panose="02020603050405020304" pitchFamily="18" charset="0"/>
+              <a:ea typeface="Calibri" panose="020F0502020204030204" pitchFamily="34" charset="0"/>
+            </a:endParaRPr>
+          </a:p>
+          <a:p>
+            <a:pPr marL="742950" lvl="1" indent="-285750">
+              <a:lnSpc>
+                <a:spcPct val="115000"/>
+              </a:lnSpc>
+              <a:buFont typeface="Courier New" panose="02070309020205020404" pitchFamily="49" charset="0"/>
+              <a:buChar char="o"/>
+            </a:pPr>
+            <a:r>
+              <a:rPr lang="en-US" sz="1200">
+                <a:effectLst/>
+                <a:latin typeface="Times New Roman" panose="02020603050405020304" pitchFamily="18" charset="0"/>
+                <a:ea typeface="Calibri" panose="020F0502020204030204" pitchFamily="34" charset="0"/>
+              </a:rPr>
+              <a:t>Các thông tin về nội dung, hình ảnh âm thanh và chủ đề sẻ được gửi về trang LessonController.</a:t>
+            </a:r>
+            <a:endParaRPr lang="en-US" sz="1800">
+              <a:effectLst/>
+              <a:latin typeface="Times New Roman" panose="02020603050405020304" pitchFamily="18" charset="0"/>
+              <a:ea typeface="Calibri" panose="020F0502020204030204" pitchFamily="34" charset="0"/>
+            </a:endParaRPr>
+          </a:p>
+          <a:p>
+            <a:pPr marL="742950" lvl="1" indent="-285750">
+              <a:lnSpc>
+                <a:spcPct val="115000"/>
+              </a:lnSpc>
+              <a:buFont typeface="Courier New" panose="02070309020205020404" pitchFamily="49" charset="0"/>
+              <a:buChar char="o"/>
+            </a:pPr>
+            <a:r>
+              <a:rPr lang="en-US" sz="1200">
+                <a:effectLst/>
+                <a:latin typeface="Times New Roman" panose="02020603050405020304" pitchFamily="18" charset="0"/>
+                <a:ea typeface="Calibri" panose="020F0502020204030204" pitchFamily="34" charset="0"/>
+              </a:rPr>
+              <a:t>Tại LessonController sẽ mapping những thông tin được gửi về thảnh một Lesson Model.</a:t>
+            </a:r>
+            <a:endParaRPr lang="en-US" sz="1800">
+              <a:effectLst/>
+              <a:latin typeface="Times New Roman" panose="02020603050405020304" pitchFamily="18" charset="0"/>
+              <a:ea typeface="Calibri" panose="020F0502020204030204" pitchFamily="34" charset="0"/>
+            </a:endParaRPr>
+          </a:p>
+          <a:p>
+            <a:pPr marL="742950" lvl="1" indent="-285750">
+              <a:lnSpc>
+                <a:spcPct val="115000"/>
+              </a:lnSpc>
+              <a:buFont typeface="Courier New" panose="02070309020205020404" pitchFamily="49" charset="0"/>
+              <a:buChar char="o"/>
+            </a:pPr>
+            <a:r>
+              <a:rPr lang="en-US" sz="1200">
+                <a:effectLst/>
+                <a:latin typeface="Times New Roman" panose="02020603050405020304" pitchFamily="18" charset="0"/>
+                <a:ea typeface="Calibri" panose="020F0502020204030204" pitchFamily="34" charset="0"/>
+              </a:rPr>
+              <a:t>Tại LessonController sau khi có Lesson Model sẽ gọi đến LessonService để gọi hàm adjustLesson(Lesson).</a:t>
+            </a:r>
+            <a:endParaRPr lang="en-US" sz="1800">
+              <a:effectLst/>
+              <a:latin typeface="Times New Roman" panose="02020603050405020304" pitchFamily="18" charset="0"/>
+              <a:ea typeface="Calibri" panose="020F0502020204030204" pitchFamily="34" charset="0"/>
+            </a:endParaRPr>
+          </a:p>
+          <a:p>
+            <a:pPr marL="742950" lvl="1" indent="-285750">
+              <a:lnSpc>
+                <a:spcPct val="115000"/>
+              </a:lnSpc>
+              <a:buFont typeface="Courier New" panose="02070309020205020404" pitchFamily="49" charset="0"/>
+              <a:buChar char="o"/>
+            </a:pPr>
+            <a:r>
+              <a:rPr lang="en-US" sz="1200">
+                <a:effectLst/>
+                <a:latin typeface="Times New Roman" panose="02020603050405020304" pitchFamily="18" charset="0"/>
+                <a:ea typeface="Calibri" panose="020F0502020204030204" pitchFamily="34" charset="0"/>
+              </a:rPr>
+              <a:t>Tại LessonService sẽ gọi đến LessonDAO sử dụng hàm adjustLesson(Lesson).</a:t>
+            </a:r>
+            <a:endParaRPr lang="en-US" sz="1800">
+              <a:effectLst/>
+              <a:latin typeface="Times New Roman" panose="02020603050405020304" pitchFamily="18" charset="0"/>
+              <a:ea typeface="Calibri" panose="020F0502020204030204" pitchFamily="34" charset="0"/>
+            </a:endParaRPr>
+          </a:p>
+          <a:p>
+            <a:pPr marL="742950" lvl="1" indent="-285750">
+              <a:lnSpc>
+                <a:spcPct val="115000"/>
+              </a:lnSpc>
+              <a:buFont typeface="Courier New" panose="02070309020205020404" pitchFamily="49" charset="0"/>
+              <a:buChar char="o"/>
+            </a:pPr>
+            <a:r>
+              <a:rPr lang="en-US" sz="1200">
+                <a:effectLst/>
+                <a:latin typeface="Times New Roman" panose="02020603050405020304" pitchFamily="18" charset="0"/>
+                <a:ea typeface="Calibri" panose="020F0502020204030204" pitchFamily="34" charset="0"/>
+              </a:rPr>
+              <a:t>Tại  LessonDAO sẽ sử dụng câu lệnh Update xuống DataBase.</a:t>
+            </a:r>
+            <a:endParaRPr lang="en-US" sz="1800">
+              <a:effectLst/>
+              <a:latin typeface="Times New Roman" panose="02020603050405020304" pitchFamily="18" charset="0"/>
+              <a:ea typeface="Calibri" panose="020F0502020204030204" pitchFamily="34" charset="0"/>
+            </a:endParaRPr>
+          </a:p>
+          <a:p>
+            <a:pPr marL="742950" lvl="1" indent="-285750">
+              <a:lnSpc>
+                <a:spcPct val="115000"/>
+              </a:lnSpc>
+              <a:buFont typeface="Courier New" panose="02070309020205020404" pitchFamily="49" charset="0"/>
+              <a:buChar char="o"/>
+            </a:pPr>
+            <a:r>
+              <a:rPr lang="en-US" sz="1200">
+                <a:effectLst/>
+                <a:latin typeface="Times New Roman" panose="02020603050405020304" pitchFamily="18" charset="0"/>
+                <a:ea typeface="Calibri" panose="020F0502020204030204" pitchFamily="34" charset="0"/>
+              </a:rPr>
+              <a:t>Nếu insert thất bại sẽ trả về thông báo lần lượt cho LessonDAO, LessonService, LessonController và hiển thại thất bại tại trang thêm bài học.</a:t>
+            </a:r>
+            <a:endParaRPr lang="en-US" sz="1800">
+              <a:effectLst/>
+              <a:latin typeface="Times New Roman" panose="02020603050405020304" pitchFamily="18" charset="0"/>
+              <a:ea typeface="Calibri" panose="020F0502020204030204" pitchFamily="34" charset="0"/>
+            </a:endParaRPr>
+          </a:p>
+          <a:p>
+            <a:pPr marL="742950" lvl="1" indent="-285750">
+              <a:lnSpc>
+                <a:spcPct val="115000"/>
+              </a:lnSpc>
+              <a:buFont typeface="Courier New" panose="02070309020205020404" pitchFamily="49" charset="0"/>
+              <a:buChar char="o"/>
+            </a:pPr>
+            <a:r>
+              <a:rPr lang="en-US" sz="1200">
+                <a:effectLst/>
+                <a:latin typeface="Times New Roman" panose="02020603050405020304" pitchFamily="18" charset="0"/>
+                <a:ea typeface="Calibri" panose="020F0502020204030204" pitchFamily="34" charset="0"/>
+              </a:rPr>
+              <a:t>Nêu Insert thành công sẽ trả về thông báo thành công cho lần lượt LessonDAO, LessonService, LessonController và hiển thị thông báo thành công tại trang thêm bài học và thông tin sẽ được cập nhật trong DataBase.</a:t>
+            </a:r>
+            <a:endParaRPr lang="en-US" sz="1800">
+              <a:effectLst/>
+              <a:latin typeface="Times New Roman" panose="02020603050405020304" pitchFamily="18" charset="0"/>
+              <a:ea typeface="Calibri" panose="020F0502020204030204" pitchFamily="34" charset="0"/>
+            </a:endParaRPr>
+          </a:p>
+          <a:p>
+            <a:pPr marL="342900" lvl="0" indent="-342900">
+              <a:lnSpc>
+                <a:spcPct val="115000"/>
+              </a:lnSpc>
+              <a:buFont typeface="Times New Roman" panose="02020603050405020304" pitchFamily="18" charset="0"/>
+              <a:buChar char="-"/>
+            </a:pPr>
+            <a:r>
+              <a:rPr lang="en-US" sz="1200">
+                <a:effectLst/>
+                <a:latin typeface="Times New Roman" panose="02020603050405020304" pitchFamily="18" charset="0"/>
+                <a:ea typeface="Calibri" panose="020F0502020204030204" pitchFamily="34" charset="0"/>
+              </a:rPr>
+              <a:t>Nếu là bài kiểm tra</a:t>
+            </a:r>
+            <a:endParaRPr lang="en-US" sz="1800">
+              <a:effectLst/>
+              <a:latin typeface="Times New Roman" panose="02020603050405020304" pitchFamily="18" charset="0"/>
+              <a:ea typeface="Calibri" panose="020F0502020204030204" pitchFamily="34" charset="0"/>
+            </a:endParaRPr>
+          </a:p>
+          <a:p>
+            <a:pPr marL="742950" lvl="1" indent="-285750">
+              <a:lnSpc>
+                <a:spcPct val="115000"/>
+              </a:lnSpc>
+              <a:buFont typeface="Courier New" panose="02070309020205020404" pitchFamily="49" charset="0"/>
+              <a:buChar char="o"/>
+            </a:pPr>
+            <a:r>
+              <a:rPr lang="en-US" sz="1200">
+                <a:effectLst/>
+                <a:latin typeface="Times New Roman" panose="02020603050405020304" pitchFamily="18" charset="0"/>
+                <a:ea typeface="Calibri" panose="020F0502020204030204" pitchFamily="34" charset="0"/>
+              </a:rPr>
+              <a:t>Các thông tin về câu hỏi, hình ảnh, âm thanh, chủ đề, 4 đáp án và đáp án đúng sẽ được gửi về trang LessonController.</a:t>
+            </a:r>
+            <a:endParaRPr lang="en-US" sz="1800">
+              <a:effectLst/>
+              <a:latin typeface="Times New Roman" panose="02020603050405020304" pitchFamily="18" charset="0"/>
+              <a:ea typeface="Calibri" panose="020F0502020204030204" pitchFamily="34" charset="0"/>
+            </a:endParaRPr>
+          </a:p>
+          <a:p>
+            <a:pPr marL="742950" lvl="1" indent="-285750">
+              <a:lnSpc>
+                <a:spcPct val="115000"/>
+              </a:lnSpc>
+              <a:buFont typeface="Courier New" panose="02070309020205020404" pitchFamily="49" charset="0"/>
+              <a:buChar char="o"/>
+            </a:pPr>
+            <a:r>
+              <a:rPr lang="en-US" sz="1200">
+                <a:effectLst/>
+                <a:latin typeface="Times New Roman" panose="02020603050405020304" pitchFamily="18" charset="0"/>
+                <a:ea typeface="Calibri" panose="020F0502020204030204" pitchFamily="34" charset="0"/>
+              </a:rPr>
+              <a:t>Tại LessonController sẽ mapping những thông tin được gửi về thành một Test Model.</a:t>
+            </a:r>
+            <a:endParaRPr lang="en-US" sz="1800">
+              <a:effectLst/>
+              <a:latin typeface="Times New Roman" panose="02020603050405020304" pitchFamily="18" charset="0"/>
+              <a:ea typeface="Calibri" panose="020F0502020204030204" pitchFamily="34" charset="0"/>
+            </a:endParaRPr>
+          </a:p>
+          <a:p>
+            <a:pPr marL="742950" lvl="1" indent="-285750">
+              <a:lnSpc>
+                <a:spcPct val="115000"/>
+              </a:lnSpc>
+              <a:buFont typeface="Courier New" panose="02070309020205020404" pitchFamily="49" charset="0"/>
+              <a:buChar char="o"/>
+            </a:pPr>
+            <a:r>
+              <a:rPr lang="en-US" sz="1200">
+                <a:effectLst/>
+                <a:latin typeface="Times New Roman" panose="02020603050405020304" pitchFamily="18" charset="0"/>
+                <a:ea typeface="Calibri" panose="020F0502020204030204" pitchFamily="34" charset="0"/>
+              </a:rPr>
+              <a:t>Tại LessonController sẽ gọi đến LessonService để sử dụng hàm saveTest(test).</a:t>
+            </a:r>
+            <a:endParaRPr lang="en-US" sz="1800">
+              <a:effectLst/>
+              <a:latin typeface="Times New Roman" panose="02020603050405020304" pitchFamily="18" charset="0"/>
+              <a:ea typeface="Calibri" panose="020F0502020204030204" pitchFamily="34" charset="0"/>
+            </a:endParaRPr>
+          </a:p>
+          <a:p>
+            <a:pPr marL="742950" lvl="1" indent="-285750">
+              <a:lnSpc>
+                <a:spcPct val="115000"/>
+              </a:lnSpc>
+              <a:buFont typeface="Courier New" panose="02070309020205020404" pitchFamily="49" charset="0"/>
+              <a:buChar char="o"/>
+            </a:pPr>
+            <a:r>
+              <a:rPr lang="en-US" sz="1200">
+                <a:effectLst/>
+                <a:latin typeface="Times New Roman" panose="02020603050405020304" pitchFamily="18" charset="0"/>
+                <a:ea typeface="Calibri" panose="020F0502020204030204" pitchFamily="34" charset="0"/>
+              </a:rPr>
+              <a:t>Tại LessonController sẽ gọi đến LessonDAO để sử dụng hàm saveTest(test).</a:t>
+            </a:r>
+            <a:endParaRPr lang="en-US" sz="1800">
+              <a:effectLst/>
+              <a:latin typeface="Times New Roman" panose="02020603050405020304" pitchFamily="18" charset="0"/>
+              <a:ea typeface="Calibri" panose="020F0502020204030204" pitchFamily="34" charset="0"/>
+            </a:endParaRPr>
+          </a:p>
+          <a:p>
+            <a:pPr marL="742950" lvl="1" indent="-285750">
+              <a:lnSpc>
+                <a:spcPct val="115000"/>
+              </a:lnSpc>
+              <a:buFont typeface="Courier New" panose="02070309020205020404" pitchFamily="49" charset="0"/>
+              <a:buChar char="o"/>
+            </a:pPr>
+            <a:r>
+              <a:rPr lang="en-US" sz="1200">
+                <a:effectLst/>
+                <a:latin typeface="Times New Roman" panose="02020603050405020304" pitchFamily="18" charset="0"/>
+                <a:ea typeface="Calibri" panose="020F0502020204030204" pitchFamily="34" charset="0"/>
+              </a:rPr>
+              <a:t>Tại LessonController sẽ insert xuống DataBase để thêm mới bài kiểm tra.</a:t>
+            </a:r>
+            <a:endParaRPr lang="en-US" sz="1800">
+              <a:effectLst/>
+              <a:latin typeface="Times New Roman" panose="02020603050405020304" pitchFamily="18" charset="0"/>
+              <a:ea typeface="Calibri" panose="020F0502020204030204" pitchFamily="34" charset="0"/>
+            </a:endParaRPr>
+          </a:p>
+          <a:p>
+            <a:pPr marL="742950" lvl="1" indent="-285750">
+              <a:lnSpc>
+                <a:spcPct val="115000"/>
+              </a:lnSpc>
+              <a:buFont typeface="Courier New" panose="02070309020205020404" pitchFamily="49" charset="0"/>
+              <a:buChar char="o"/>
+            </a:pPr>
+            <a:r>
+              <a:rPr lang="en-US" sz="1200">
+                <a:effectLst/>
+                <a:latin typeface="Times New Roman" panose="02020603050405020304" pitchFamily="18" charset="0"/>
+                <a:ea typeface="Calibri" panose="020F0502020204030204" pitchFamily="34" charset="0"/>
+              </a:rPr>
+              <a:t>Nếu insert thất bại sẽ trả về thông báo lần lượt cho LessonDAO, LessonService, LessonController và hiển thại thất bại tại trang thêm bài học.</a:t>
+            </a:r>
+            <a:endParaRPr lang="en-US" sz="1800">
+              <a:effectLst/>
+              <a:latin typeface="Times New Roman" panose="02020603050405020304" pitchFamily="18" charset="0"/>
+              <a:ea typeface="Calibri" panose="020F0502020204030204" pitchFamily="34" charset="0"/>
+            </a:endParaRPr>
+          </a:p>
+          <a:p>
+            <a:pPr marL="742950" lvl="1" indent="-285750">
+              <a:lnSpc>
+                <a:spcPct val="115000"/>
+              </a:lnSpc>
+              <a:buFont typeface="Courier New" panose="02070309020205020404" pitchFamily="49" charset="0"/>
+              <a:buChar char="o"/>
+            </a:pPr>
+            <a:r>
+              <a:rPr lang="en-US" sz="1200">
+                <a:effectLst/>
+                <a:latin typeface="Times New Roman" panose="02020603050405020304" pitchFamily="18" charset="0"/>
+                <a:ea typeface="Calibri" panose="020F0502020204030204" pitchFamily="34" charset="0"/>
+              </a:rPr>
+              <a:t>Nêu Insert thành công sẽ trả về thông báo thành công cho lần lượt LessonDAO, LessonService, LessonController và hiển thị thông báo thành công tại trang thêm bài học và thông tin sẽ được cập nhật trong DataBase.</a:t>
+            </a:r>
+            <a:endParaRPr lang="en-US" sz="1800">
+              <a:effectLst/>
+              <a:latin typeface="Times New Roman" panose="02020603050405020304" pitchFamily="18" charset="0"/>
+              <a:ea typeface="Calibri" panose="020F0502020204030204" pitchFamily="34" charset="0"/>
+            </a:endParaRPr>
+          </a:p>
+          <a:p>
+            <a:pPr marL="342900" lvl="0" indent="-342900">
+              <a:lnSpc>
+                <a:spcPct val="115000"/>
+              </a:lnSpc>
+              <a:spcAft>
+                <a:spcPts val="1000"/>
+              </a:spcAft>
+              <a:buFont typeface="Times New Roman" panose="02020603050405020304" pitchFamily="18" charset="0"/>
+              <a:buChar char="-"/>
+            </a:pPr>
+            <a:r>
+              <a:rPr lang="en-US" sz="1200">
+                <a:effectLst/>
+                <a:latin typeface="Times New Roman" panose="02020603050405020304" pitchFamily="18" charset="0"/>
+                <a:ea typeface="Calibri" panose="020F0502020204030204" pitchFamily="34" charset="0"/>
+              </a:rPr>
+              <a:t>Hệ thống sẽ hiện thông báo thành công và lưu thay đổi vào cơ sở dữ liệu.</a:t>
+            </a:r>
+            <a:endParaRPr lang="en-US" sz="1800">
+              <a:effectLst/>
+              <a:latin typeface="Times New Roman" panose="02020603050405020304" pitchFamily="18" charset="0"/>
+              <a:ea typeface="Calibri" panose="020F0502020204030204" pitchFamily="34" charset="0"/>
+            </a:endParaRPr>
+          </a:p>
+          <a:p>
+            <a:pPr marL="457200">
+              <a:lnSpc>
+                <a:spcPct val="115000"/>
+              </a:lnSpc>
+              <a:spcAft>
+                <a:spcPts val="1000"/>
+              </a:spcAft>
+            </a:pPr>
+            <a:r>
+              <a:rPr lang="en-US" sz="1200">
+                <a:effectLst/>
+                <a:latin typeface="Times New Roman" panose="02020603050405020304" pitchFamily="18" charset="0"/>
+                <a:ea typeface="Calibri" panose="020F0502020204030204" pitchFamily="34" charset="0"/>
+              </a:rPr>
+              <a:t>Dòng sự kiện ngoại lệ:</a:t>
+            </a:r>
+            <a:endParaRPr lang="en-US" sz="1800">
+              <a:effectLst/>
+              <a:latin typeface="Times New Roman" panose="02020603050405020304" pitchFamily="18" charset="0"/>
+              <a:ea typeface="Calibri" panose="020F0502020204030204" pitchFamily="34" charset="0"/>
+            </a:endParaRPr>
+          </a:p>
+          <a:p>
+            <a:pPr marL="457200">
+              <a:lnSpc>
+                <a:spcPct val="115000"/>
+              </a:lnSpc>
+              <a:spcAft>
+                <a:spcPts val="1000"/>
+              </a:spcAft>
+            </a:pPr>
+            <a:r>
+              <a:rPr lang="en-US" sz="1200">
+                <a:effectLst/>
+                <a:latin typeface="Times New Roman" panose="02020603050405020304" pitchFamily="18" charset="0"/>
+                <a:ea typeface="Calibri" panose="020F0502020204030204" pitchFamily="34" charset="0"/>
+              </a:rPr>
+              <a:t>[ Người admin thoát ra trong lúc thực hiện thay đổi ]</a:t>
+            </a:r>
+            <a:endParaRPr lang="en-US" sz="1800">
+              <a:effectLst/>
+              <a:latin typeface="Times New Roman" panose="02020603050405020304" pitchFamily="18" charset="0"/>
+              <a:ea typeface="Calibri" panose="020F0502020204030204" pitchFamily="34" charset="0"/>
+            </a:endParaRPr>
+          </a:p>
+          <a:p>
+            <a:pPr marL="342900" lvl="0" indent="-342900">
+              <a:lnSpc>
+                <a:spcPct val="115000"/>
+              </a:lnSpc>
+              <a:spcAft>
+                <a:spcPts val="1000"/>
+              </a:spcAft>
+              <a:buFont typeface="Times New Roman" panose="02020603050405020304" pitchFamily="18" charset="0"/>
+              <a:buChar char="-"/>
+            </a:pPr>
+            <a:r>
+              <a:rPr lang="en-US" sz="1200">
+                <a:effectLst/>
+                <a:latin typeface="Times New Roman" panose="02020603050405020304" pitchFamily="18" charset="0"/>
+                <a:ea typeface="Calibri" panose="020F0502020204030204" pitchFamily="34" charset="0"/>
+              </a:rPr>
+              <a:t>Toàn bộ thông tin vẫn được giữ nguyên trong cơ sở dữ liệu.</a:t>
+            </a:r>
+            <a:endParaRPr lang="en-US" sz="1800">
+              <a:effectLst/>
+              <a:latin typeface="Times New Roman" panose="02020603050405020304" pitchFamily="18" charset="0"/>
+              <a:ea typeface="Calibri" panose="020F0502020204030204" pitchFamily="34" charset="0"/>
+            </a:endParaRPr>
+          </a:p>
+          <a:p>
+            <a:pPr marL="342900" lvl="0" indent="-342900">
+              <a:lnSpc>
+                <a:spcPct val="115000"/>
+              </a:lnSpc>
+              <a:spcAft>
+                <a:spcPts val="1000"/>
+              </a:spcAft>
+              <a:buFont typeface="Times New Roman" panose="02020603050405020304" pitchFamily="18" charset="0"/>
+              <a:buChar char="-"/>
+            </a:pPr>
+            <a:endParaRPr lang="en-US" sz="1800">
+              <a:effectLst/>
+              <a:latin typeface="Times New Roman" panose="02020603050405020304" pitchFamily="18" charset="0"/>
+              <a:ea typeface="Calibri" panose="020F0502020204030204" pitchFamily="34" charset="0"/>
+            </a:endParaRPr>
           </a:p>
         </p:txBody>
       </p:sp>
@@ -7242,7 +8523,7 @@
           <a:p>
             <a:fld id="{166BE8A9-1332-43C3-9C65-C26D4AF875E6}" type="slidenum">
               <a:rPr lang="en-US" smtClean="0"/>
-              <a:t>15</a:t>
+              <a:t>13</a:t>
             </a:fld>
             <a:endParaRPr lang="en-US"/>
           </a:p>
@@ -7251,7 +8532,7 @@
     </p:spTree>
     <p:extLst>
       <p:ext uri="{BB962C8B-B14F-4D97-AF65-F5344CB8AC3E}">
-        <p14:creationId xmlns:p14="http://schemas.microsoft.com/office/powerpoint/2010/main" val="487346144"/>
+        <p14:creationId xmlns:p14="http://schemas.microsoft.com/office/powerpoint/2010/main" val="2317970178"/>
       </p:ext>
     </p:extLst>
   </p:cSld>
@@ -7763,7 +9044,7 @@
           <a:p>
             <a:fld id="{63A1C593-65D0-4073-BCC9-577B9352EA97}" type="datetimeFigureOut">
               <a:rPr lang="en-US" smtClean="0"/>
-              <a:t>6/19/2021</a:t>
+              <a:t>6/26/2021</a:t>
             </a:fld>
             <a:endParaRPr lang="en-US"/>
           </a:p>
@@ -8059,7 +9340,7 @@
           <a:p>
             <a:fld id="{63A1C593-65D0-4073-BCC9-577B9352EA97}" type="datetimeFigureOut">
               <a:rPr lang="en-US" smtClean="0"/>
-              <a:t>6/19/2021</a:t>
+              <a:t>6/26/2021</a:t>
             </a:fld>
             <a:endParaRPr lang="en-US"/>
           </a:p>
@@ -8307,7 +9588,7 @@
           <a:p>
             <a:fld id="{63A1C593-65D0-4073-BCC9-577B9352EA97}" type="datetimeFigureOut">
               <a:rPr lang="en-US" smtClean="0"/>
-              <a:t>6/19/2021</a:t>
+              <a:t>6/26/2021</a:t>
             </a:fld>
             <a:endParaRPr lang="en-US"/>
           </a:p>
@@ -8847,7 +10128,7 @@
           <a:p>
             <a:fld id="{63A1C593-65D0-4073-BCC9-577B9352EA97}" type="datetimeFigureOut">
               <a:rPr lang="en-US" smtClean="0"/>
-              <a:t>6/19/2021</a:t>
+              <a:t>6/26/2021</a:t>
             </a:fld>
             <a:endParaRPr lang="en-US"/>
           </a:p>
@@ -9095,7 +10376,7 @@
           <a:p>
             <a:fld id="{63A1C593-65D0-4073-BCC9-577B9352EA97}" type="datetimeFigureOut">
               <a:rPr lang="en-US" smtClean="0"/>
-              <a:t>6/19/2021</a:t>
+              <a:t>6/26/2021</a:t>
             </a:fld>
             <a:endParaRPr lang="en-US"/>
           </a:p>
@@ -9627,7 +10908,7 @@
           <a:p>
             <a:fld id="{63A1C593-65D0-4073-BCC9-577B9352EA97}" type="datetimeFigureOut">
               <a:rPr lang="en-US" smtClean="0"/>
-              <a:t>6/19/2021</a:t>
+              <a:t>6/26/2021</a:t>
             </a:fld>
             <a:endParaRPr lang="en-US"/>
           </a:p>
@@ -9924,7 +11205,7 @@
           <a:p>
             <a:fld id="{63A1C593-65D0-4073-BCC9-577B9352EA97}" type="datetimeFigureOut">
               <a:rPr lang="en-US" smtClean="0"/>
-              <a:t>6/19/2021</a:t>
+              <a:t>6/26/2021</a:t>
             </a:fld>
             <a:endParaRPr lang="en-US"/>
           </a:p>
@@ -10098,7 +11379,7 @@
           <a:p>
             <a:fld id="{63A1C593-65D0-4073-BCC9-577B9352EA97}" type="datetimeFigureOut">
               <a:rPr lang="en-US" smtClean="0"/>
-              <a:t>6/19/2021</a:t>
+              <a:t>6/26/2021</a:t>
             </a:fld>
             <a:endParaRPr lang="en-US"/>
           </a:p>
@@ -10278,7 +11559,7 @@
           <a:p>
             <a:fld id="{63A1C593-65D0-4073-BCC9-577B9352EA97}" type="datetimeFigureOut">
               <a:rPr lang="en-US" smtClean="0"/>
-              <a:t>6/19/2021</a:t>
+              <a:t>6/26/2021</a:t>
             </a:fld>
             <a:endParaRPr lang="en-US"/>
           </a:p>
@@ -10448,7 +11729,7 @@
           <a:p>
             <a:fld id="{63A1C593-65D0-4073-BCC9-577B9352EA97}" type="datetimeFigureOut">
               <a:rPr lang="en-US" smtClean="0"/>
-              <a:t>6/19/2021</a:t>
+              <a:t>6/26/2021</a:t>
             </a:fld>
             <a:endParaRPr lang="en-US"/>
           </a:p>
@@ -10699,7 +11980,7 @@
           <a:p>
             <a:fld id="{63A1C593-65D0-4073-BCC9-577B9352EA97}" type="datetimeFigureOut">
               <a:rPr lang="en-US" smtClean="0"/>
-              <a:t>6/19/2021</a:t>
+              <a:t>6/26/2021</a:t>
             </a:fld>
             <a:endParaRPr lang="en-US"/>
           </a:p>
@@ -10996,7 +12277,7 @@
           <a:p>
             <a:fld id="{63A1C593-65D0-4073-BCC9-577B9352EA97}" type="datetimeFigureOut">
               <a:rPr lang="en-US" smtClean="0"/>
-              <a:t>6/19/2021</a:t>
+              <a:t>6/26/2021</a:t>
             </a:fld>
             <a:endParaRPr lang="en-US"/>
           </a:p>
@@ -11438,7 +12719,7 @@
           <a:p>
             <a:fld id="{63A1C593-65D0-4073-BCC9-577B9352EA97}" type="datetimeFigureOut">
               <a:rPr lang="en-US" smtClean="0"/>
-              <a:t>6/19/2021</a:t>
+              <a:t>6/26/2021</a:t>
             </a:fld>
             <a:endParaRPr lang="en-US"/>
           </a:p>
@@ -11556,7 +12837,7 @@
           <a:p>
             <a:fld id="{63A1C593-65D0-4073-BCC9-577B9352EA97}" type="datetimeFigureOut">
               <a:rPr lang="en-US" smtClean="0"/>
-              <a:t>6/19/2021</a:t>
+              <a:t>6/26/2021</a:t>
             </a:fld>
             <a:endParaRPr lang="en-US"/>
           </a:p>
@@ -11651,7 +12932,7 @@
           <a:p>
             <a:fld id="{63A1C593-65D0-4073-BCC9-577B9352EA97}" type="datetimeFigureOut">
               <a:rPr lang="en-US" smtClean="0"/>
-              <a:t>6/19/2021</a:t>
+              <a:t>6/26/2021</a:t>
             </a:fld>
             <a:endParaRPr lang="en-US"/>
           </a:p>
@@ -11934,7 +13215,7 @@
           <a:p>
             <a:fld id="{63A1C593-65D0-4073-BCC9-577B9352EA97}" type="datetimeFigureOut">
               <a:rPr lang="en-US" smtClean="0"/>
-              <a:t>6/19/2021</a:t>
+              <a:t>6/26/2021</a:t>
             </a:fld>
             <a:endParaRPr lang="en-US"/>
           </a:p>
@@ -12225,7 +13506,7 @@
           <a:p>
             <a:fld id="{63A1C593-65D0-4073-BCC9-577B9352EA97}" type="datetimeFigureOut">
               <a:rPr lang="en-US" smtClean="0"/>
-              <a:t>6/19/2021</a:t>
+              <a:t>6/26/2021</a:t>
             </a:fld>
             <a:endParaRPr lang="en-US"/>
           </a:p>
@@ -12755,7 +14036,7 @@
           <a:p>
             <a:fld id="{63A1C593-65D0-4073-BCC9-577B9352EA97}" type="datetimeFigureOut">
               <a:rPr lang="en-US" smtClean="0"/>
-              <a:t>6/19/2021</a:t>
+              <a:t>6/26/2021</a:t>
             </a:fld>
             <a:endParaRPr lang="en-US"/>
           </a:p>
@@ -14981,6 +16262,522 @@
           <p:cNvPr id="2" name="Title 1">
             <a:extLst>
               <a:ext uri="{FF2B5EF4-FFF2-40B4-BE49-F238E27FC236}">
+                <a16:creationId xmlns:a16="http://schemas.microsoft.com/office/drawing/2014/main" id="{226B3B11-2069-4E0E-9B54-5D1611C6CEB5}"/>
+              </a:ext>
+            </a:extLst>
+          </p:cNvPr>
+          <p:cNvSpPr>
+            <a:spLocks noGrp="1"/>
+          </p:cNvSpPr>
+          <p:nvPr>
+            <p:ph type="title"/>
+          </p:nvPr>
+        </p:nvSpPr>
+        <p:spPr>
+          <a:xfrm>
+            <a:off x="1511186" y="10886"/>
+            <a:ext cx="10018713" cy="1752599"/>
+          </a:xfrm>
+        </p:spPr>
+        <p:txBody>
+          <a:bodyPr/>
+          <a:lstStyle/>
+          <a:p>
+            <a:pPr algn="l"/>
+            <a:r>
+              <a:rPr lang="en-US"/>
+              <a:t>Chỉnh sửa bài học</a:t>
+            </a:r>
+          </a:p>
+        </p:txBody>
+      </p:sp>
+      <p:graphicFrame>
+        <p:nvGraphicFramePr>
+          <p:cNvPr id="3" name="Table 2">
+            <a:extLst>
+              <a:ext uri="{FF2B5EF4-FFF2-40B4-BE49-F238E27FC236}">
+                <a16:creationId xmlns:a16="http://schemas.microsoft.com/office/drawing/2014/main" id="{03924BAB-FB87-4CC7-87BC-2F62E85F69BA}"/>
+              </a:ext>
+            </a:extLst>
+          </p:cNvPr>
+          <p:cNvGraphicFramePr>
+            <a:graphicFrameLocks noGrp="1"/>
+          </p:cNvGraphicFramePr>
+          <p:nvPr>
+            <p:extLst>
+              <p:ext uri="{D42A27DB-BD31-4B8C-83A1-F6EECF244321}">
+                <p14:modId xmlns:p14="http://schemas.microsoft.com/office/powerpoint/2010/main" val="3638062120"/>
+              </p:ext>
+            </p:extLst>
+          </p:nvPr>
+        </p:nvGraphicFramePr>
+        <p:xfrm>
+          <a:off x="2258786" y="1676400"/>
+          <a:ext cx="7674429" cy="4711055"/>
+        </p:xfrm>
+        <a:graphic>
+          <a:graphicData uri="http://schemas.openxmlformats.org/drawingml/2006/table">
+            <a:tbl>
+              <a:tblPr firstRow="1" firstCol="1" bandRow="1">
+                <a:tableStyleId>{5C22544A-7EE6-4342-B048-85BDC9FD1C3A}</a:tableStyleId>
+              </a:tblPr>
+              <a:tblGrid>
+                <a:gridCol w="2147264">
+                  <a:extLst>
+                    <a:ext uri="{9D8B030D-6E8A-4147-A177-3AD203B41FA5}">
+                      <a16:colId xmlns:a16="http://schemas.microsoft.com/office/drawing/2014/main" val="641265126"/>
+                    </a:ext>
+                  </a:extLst>
+                </a:gridCol>
+                <a:gridCol w="5527165">
+                  <a:extLst>
+                    <a:ext uri="{9D8B030D-6E8A-4147-A177-3AD203B41FA5}">
+                      <a16:colId xmlns:a16="http://schemas.microsoft.com/office/drawing/2014/main" val="2825853925"/>
+                    </a:ext>
+                  </a:extLst>
+                </a:gridCol>
+              </a:tblGrid>
+              <a:tr h="518139">
+                <a:tc>
+                  <a:txBody>
+                    <a:bodyPr/>
+                    <a:lstStyle/>
+                    <a:p>
+                      <a:pPr marL="457200">
+                        <a:lnSpc>
+                          <a:spcPct val="115000"/>
+                        </a:lnSpc>
+                        <a:spcAft>
+                          <a:spcPts val="1000"/>
+                        </a:spcAft>
+                      </a:pPr>
+                      <a:r>
+                        <a:rPr lang="en-US" sz="1200">
+                          <a:effectLst/>
+                          <a:latin typeface="Times New Roman" panose="02020603050405020304" pitchFamily="18" charset="0"/>
+                          <a:ea typeface="Calibri" panose="020F0502020204030204" pitchFamily="34" charset="0"/>
+                        </a:rPr>
+                        <a:t>Tên</a:t>
+                      </a:r>
+                      <a:endParaRPr lang="en-US" sz="1800">
+                        <a:effectLst/>
+                        <a:latin typeface="Times New Roman" panose="02020603050405020304" pitchFamily="18" charset="0"/>
+                        <a:ea typeface="Calibri" panose="020F0502020204030204" pitchFamily="34" charset="0"/>
+                      </a:endParaRPr>
+                    </a:p>
+                  </a:txBody>
+                  <a:tcPr marL="68580" marR="68580" marT="0" marB="0"/>
+                </a:tc>
+                <a:tc>
+                  <a:txBody>
+                    <a:bodyPr/>
+                    <a:lstStyle/>
+                    <a:p>
+                      <a:pPr marL="457200">
+                        <a:lnSpc>
+                          <a:spcPct val="115000"/>
+                        </a:lnSpc>
+                        <a:spcAft>
+                          <a:spcPts val="1000"/>
+                        </a:spcAft>
+                      </a:pPr>
+                      <a:r>
+                        <a:rPr lang="en-US" sz="1200">
+                          <a:effectLst/>
+                          <a:latin typeface="Times New Roman" panose="02020603050405020304" pitchFamily="18" charset="0"/>
+                          <a:ea typeface="Calibri" panose="020F0502020204030204" pitchFamily="34" charset="0"/>
+                        </a:rPr>
+                        <a:t>Chỉnh sửa bài học</a:t>
+                      </a:r>
+                      <a:endParaRPr lang="en-US" sz="1800">
+                        <a:effectLst/>
+                        <a:latin typeface="Times New Roman" panose="02020603050405020304" pitchFamily="18" charset="0"/>
+                        <a:ea typeface="Calibri" panose="020F0502020204030204" pitchFamily="34" charset="0"/>
+                      </a:endParaRPr>
+                    </a:p>
+                  </a:txBody>
+                  <a:tcPr marL="68580" marR="68580" marT="0" marB="0"/>
+                </a:tc>
+                <a:extLst>
+                  <a:ext uri="{0D108BD9-81ED-4DB2-BD59-A6C34878D82A}">
+                    <a16:rowId xmlns:a16="http://schemas.microsoft.com/office/drawing/2014/main" val="4234619729"/>
+                  </a:ext>
+                </a:extLst>
+              </a:tr>
+              <a:tr h="518139">
+                <a:tc>
+                  <a:txBody>
+                    <a:bodyPr/>
+                    <a:lstStyle/>
+                    <a:p>
+                      <a:pPr marL="457200">
+                        <a:lnSpc>
+                          <a:spcPct val="115000"/>
+                        </a:lnSpc>
+                        <a:spcAft>
+                          <a:spcPts val="1000"/>
+                        </a:spcAft>
+                      </a:pPr>
+                      <a:r>
+                        <a:rPr lang="en-US" sz="1200">
+                          <a:effectLst/>
+                          <a:latin typeface="Times New Roman" panose="02020603050405020304" pitchFamily="18" charset="0"/>
+                          <a:ea typeface="Calibri" panose="020F0502020204030204" pitchFamily="34" charset="0"/>
+                        </a:rPr>
+                        <a:t>Actors</a:t>
+                      </a:r>
+                      <a:endParaRPr lang="en-US" sz="1800">
+                        <a:effectLst/>
+                        <a:latin typeface="Times New Roman" panose="02020603050405020304" pitchFamily="18" charset="0"/>
+                        <a:ea typeface="Calibri" panose="020F0502020204030204" pitchFamily="34" charset="0"/>
+                      </a:endParaRPr>
+                    </a:p>
+                  </a:txBody>
+                  <a:tcPr marL="68580" marR="68580" marT="0" marB="0"/>
+                </a:tc>
+                <a:tc>
+                  <a:txBody>
+                    <a:bodyPr/>
+                    <a:lstStyle/>
+                    <a:p>
+                      <a:pPr marL="457200">
+                        <a:lnSpc>
+                          <a:spcPct val="115000"/>
+                        </a:lnSpc>
+                        <a:spcAft>
+                          <a:spcPts val="1000"/>
+                        </a:spcAft>
+                      </a:pPr>
+                      <a:r>
+                        <a:rPr lang="en-US" sz="1200">
+                          <a:effectLst/>
+                          <a:latin typeface="Times New Roman" panose="02020603050405020304" pitchFamily="18" charset="0"/>
+                          <a:ea typeface="Calibri" panose="020F0502020204030204" pitchFamily="34" charset="0"/>
+                        </a:rPr>
+                        <a:t>Admin</a:t>
+                      </a:r>
+                      <a:endParaRPr lang="en-US" sz="1800">
+                        <a:effectLst/>
+                        <a:latin typeface="Times New Roman" panose="02020603050405020304" pitchFamily="18" charset="0"/>
+                        <a:ea typeface="Calibri" panose="020F0502020204030204" pitchFamily="34" charset="0"/>
+                      </a:endParaRPr>
+                    </a:p>
+                  </a:txBody>
+                  <a:tcPr marL="68580" marR="68580" marT="0" marB="0"/>
+                </a:tc>
+                <a:extLst>
+                  <a:ext uri="{0D108BD9-81ED-4DB2-BD59-A6C34878D82A}">
+                    <a16:rowId xmlns:a16="http://schemas.microsoft.com/office/drawing/2014/main" val="2447354973"/>
+                  </a:ext>
+                </a:extLst>
+              </a:tr>
+              <a:tr h="518139">
+                <a:tc>
+                  <a:txBody>
+                    <a:bodyPr/>
+                    <a:lstStyle/>
+                    <a:p>
+                      <a:pPr marL="457200">
+                        <a:lnSpc>
+                          <a:spcPct val="115000"/>
+                        </a:lnSpc>
+                        <a:spcAft>
+                          <a:spcPts val="1000"/>
+                        </a:spcAft>
+                      </a:pPr>
+                      <a:r>
+                        <a:rPr lang="en-US" sz="1200">
+                          <a:effectLst/>
+                          <a:latin typeface="Times New Roman" panose="02020603050405020304" pitchFamily="18" charset="0"/>
+                          <a:ea typeface="Calibri" panose="020F0502020204030204" pitchFamily="34" charset="0"/>
+                        </a:rPr>
+                        <a:t>Tóm tăt</a:t>
+                      </a:r>
+                      <a:endParaRPr lang="en-US" sz="1800">
+                        <a:effectLst/>
+                        <a:latin typeface="Times New Roman" panose="02020603050405020304" pitchFamily="18" charset="0"/>
+                        <a:ea typeface="Calibri" panose="020F0502020204030204" pitchFamily="34" charset="0"/>
+                      </a:endParaRPr>
+                    </a:p>
+                  </a:txBody>
+                  <a:tcPr marL="68580" marR="68580" marT="0" marB="0"/>
+                </a:tc>
+                <a:tc>
+                  <a:txBody>
+                    <a:bodyPr/>
+                    <a:lstStyle/>
+                    <a:p>
+                      <a:pPr marL="457200">
+                        <a:lnSpc>
+                          <a:spcPct val="115000"/>
+                        </a:lnSpc>
+                        <a:spcAft>
+                          <a:spcPts val="1000"/>
+                        </a:spcAft>
+                      </a:pPr>
+                      <a:r>
+                        <a:rPr lang="en-US" sz="1200">
+                          <a:effectLst/>
+                          <a:latin typeface="Times New Roman" panose="02020603050405020304" pitchFamily="18" charset="0"/>
+                          <a:ea typeface="Calibri" panose="020F0502020204030204" pitchFamily="34" charset="0"/>
+                        </a:rPr>
+                        <a:t>Người dùng mong muốn thay đổi nội dung bài học hoặc nội dung bài kiểm tra.</a:t>
+                      </a:r>
+                      <a:endParaRPr lang="en-US" sz="1800">
+                        <a:effectLst/>
+                        <a:latin typeface="Times New Roman" panose="02020603050405020304" pitchFamily="18" charset="0"/>
+                        <a:ea typeface="Calibri" panose="020F0502020204030204" pitchFamily="34" charset="0"/>
+                      </a:endParaRPr>
+                    </a:p>
+                  </a:txBody>
+                  <a:tcPr marL="68580" marR="68580" marT="0" marB="0"/>
+                </a:tc>
+                <a:extLst>
+                  <a:ext uri="{0D108BD9-81ED-4DB2-BD59-A6C34878D82A}">
+                    <a16:rowId xmlns:a16="http://schemas.microsoft.com/office/drawing/2014/main" val="3263370727"/>
+                  </a:ext>
+                </a:extLst>
+              </a:tr>
+              <a:tr h="1071176">
+                <a:tc>
+                  <a:txBody>
+                    <a:bodyPr/>
+                    <a:lstStyle/>
+                    <a:p>
+                      <a:pPr marL="457200">
+                        <a:lnSpc>
+                          <a:spcPct val="115000"/>
+                        </a:lnSpc>
+                        <a:spcAft>
+                          <a:spcPts val="1000"/>
+                        </a:spcAft>
+                      </a:pPr>
+                      <a:r>
+                        <a:rPr lang="en-US" sz="1200">
+                          <a:effectLst/>
+                          <a:latin typeface="Times New Roman" panose="02020603050405020304" pitchFamily="18" charset="0"/>
+                          <a:ea typeface="Calibri" panose="020F0502020204030204" pitchFamily="34" charset="0"/>
+                        </a:rPr>
+                        <a:t>Điều kiện tiên quyết</a:t>
+                      </a:r>
+                      <a:endParaRPr lang="en-US" sz="1800">
+                        <a:effectLst/>
+                        <a:latin typeface="Times New Roman" panose="02020603050405020304" pitchFamily="18" charset="0"/>
+                        <a:ea typeface="Calibri" panose="020F0502020204030204" pitchFamily="34" charset="0"/>
+                      </a:endParaRPr>
+                    </a:p>
+                  </a:txBody>
+                  <a:tcPr marL="68580" marR="68580" marT="0" marB="0"/>
+                </a:tc>
+                <a:tc>
+                  <a:txBody>
+                    <a:bodyPr/>
+                    <a:lstStyle/>
+                    <a:p>
+                      <a:pPr marL="457200">
+                        <a:lnSpc>
+                          <a:spcPct val="115000"/>
+                        </a:lnSpc>
+                        <a:spcAft>
+                          <a:spcPts val="1000"/>
+                        </a:spcAft>
+                      </a:pPr>
+                      <a:r>
+                        <a:rPr lang="en-US" sz="1200">
+                          <a:effectLst/>
+                          <a:latin typeface="Times New Roman" panose="02020603050405020304" pitchFamily="18" charset="0"/>
+                          <a:ea typeface="Calibri" panose="020F0502020204030204" pitchFamily="34" charset="0"/>
+                        </a:rPr>
+                        <a:t>Người admin phải đăng nhập vào hệ thống với phân quyền admin.</a:t>
+                      </a:r>
+                      <a:endParaRPr lang="en-US" sz="1800">
+                        <a:effectLst/>
+                        <a:latin typeface="Times New Roman" panose="02020603050405020304" pitchFamily="18" charset="0"/>
+                        <a:ea typeface="Calibri" panose="020F0502020204030204" pitchFamily="34" charset="0"/>
+                      </a:endParaRPr>
+                    </a:p>
+                  </a:txBody>
+                  <a:tcPr marL="68580" marR="68580" marT="0" marB="0"/>
+                </a:tc>
+                <a:extLst>
+                  <a:ext uri="{0D108BD9-81ED-4DB2-BD59-A6C34878D82A}">
+                    <a16:rowId xmlns:a16="http://schemas.microsoft.com/office/drawing/2014/main" val="676806107"/>
+                  </a:ext>
+                </a:extLst>
+              </a:tr>
+              <a:tr h="1014286">
+                <a:tc>
+                  <a:txBody>
+                    <a:bodyPr/>
+                    <a:lstStyle/>
+                    <a:p>
+                      <a:pPr marL="457200">
+                        <a:lnSpc>
+                          <a:spcPct val="115000"/>
+                        </a:lnSpc>
+                        <a:spcAft>
+                          <a:spcPts val="1000"/>
+                        </a:spcAft>
+                      </a:pPr>
+                      <a:r>
+                        <a:rPr lang="en-US" sz="1200">
+                          <a:effectLst/>
+                          <a:latin typeface="Times New Roman" panose="02020603050405020304" pitchFamily="18" charset="0"/>
+                          <a:ea typeface="Calibri" panose="020F0502020204030204" pitchFamily="34" charset="0"/>
+                        </a:rPr>
+                        <a:t>Sự kiện bắt đầu</a:t>
+                      </a:r>
+                      <a:endParaRPr lang="en-US" sz="1800">
+                        <a:effectLst/>
+                        <a:latin typeface="Times New Roman" panose="02020603050405020304" pitchFamily="18" charset="0"/>
+                        <a:ea typeface="Calibri" panose="020F0502020204030204" pitchFamily="34" charset="0"/>
+                      </a:endParaRPr>
+                    </a:p>
+                  </a:txBody>
+                  <a:tcPr marL="68580" marR="68580" marT="0" marB="0"/>
+                </a:tc>
+                <a:tc>
+                  <a:txBody>
+                    <a:bodyPr/>
+                    <a:lstStyle/>
+                    <a:p>
+                      <a:pPr marL="457200">
+                        <a:lnSpc>
+                          <a:spcPct val="115000"/>
+                        </a:lnSpc>
+                        <a:spcAft>
+                          <a:spcPts val="1000"/>
+                        </a:spcAft>
+                      </a:pPr>
+                      <a:r>
+                        <a:rPr lang="en-US" sz="1200">
+                          <a:effectLst/>
+                          <a:latin typeface="Times New Roman" panose="02020603050405020304" pitchFamily="18" charset="0"/>
+                          <a:ea typeface="Calibri" panose="020F0502020204030204" pitchFamily="34" charset="0"/>
+                        </a:rPr>
+                        <a:t>Người admin chọn vào phần chỉnh sửa trong giao diện của bài học hay câu hỏi.</a:t>
+                      </a:r>
+                      <a:endParaRPr lang="en-US" sz="1800">
+                        <a:effectLst/>
+                        <a:latin typeface="Times New Roman" panose="02020603050405020304" pitchFamily="18" charset="0"/>
+                        <a:ea typeface="Calibri" panose="020F0502020204030204" pitchFamily="34" charset="0"/>
+                      </a:endParaRPr>
+                    </a:p>
+                  </a:txBody>
+                  <a:tcPr marL="68580" marR="68580" marT="0" marB="0"/>
+                </a:tc>
+                <a:extLst>
+                  <a:ext uri="{0D108BD9-81ED-4DB2-BD59-A6C34878D82A}">
+                    <a16:rowId xmlns:a16="http://schemas.microsoft.com/office/drawing/2014/main" val="1865154138"/>
+                  </a:ext>
+                </a:extLst>
+              </a:tr>
+              <a:tr h="1071176">
+                <a:tc>
+                  <a:txBody>
+                    <a:bodyPr/>
+                    <a:lstStyle/>
+                    <a:p>
+                      <a:pPr marL="457200">
+                        <a:lnSpc>
+                          <a:spcPct val="115000"/>
+                        </a:lnSpc>
+                        <a:spcAft>
+                          <a:spcPts val="1000"/>
+                        </a:spcAft>
+                      </a:pPr>
+                      <a:r>
+                        <a:rPr lang="en-US" sz="1200">
+                          <a:effectLst/>
+                          <a:latin typeface="Times New Roman" panose="02020603050405020304" pitchFamily="18" charset="0"/>
+                          <a:ea typeface="Calibri" panose="020F0502020204030204" pitchFamily="34" charset="0"/>
+                        </a:rPr>
+                        <a:t>Sự kiện kết thúc</a:t>
+                      </a:r>
+                      <a:endParaRPr lang="en-US" sz="1800">
+                        <a:effectLst/>
+                        <a:latin typeface="Times New Roman" panose="02020603050405020304" pitchFamily="18" charset="0"/>
+                        <a:ea typeface="Calibri" panose="020F0502020204030204" pitchFamily="34" charset="0"/>
+                      </a:endParaRPr>
+                    </a:p>
+                  </a:txBody>
+                  <a:tcPr marL="68580" marR="68580" marT="0" marB="0"/>
+                </a:tc>
+                <a:tc>
+                  <a:txBody>
+                    <a:bodyPr/>
+                    <a:lstStyle/>
+                    <a:p>
+                      <a:pPr marL="457200">
+                        <a:lnSpc>
+                          <a:spcPct val="115000"/>
+                        </a:lnSpc>
+                        <a:spcAft>
+                          <a:spcPts val="1000"/>
+                        </a:spcAft>
+                      </a:pPr>
+                      <a:r>
+                        <a:rPr lang="en-US" sz="1200">
+                          <a:effectLst/>
+                          <a:latin typeface="Times New Roman" panose="02020603050405020304" pitchFamily="18" charset="0"/>
+                          <a:ea typeface="Calibri" panose="020F0502020204030204" pitchFamily="34" charset="0"/>
+                        </a:rPr>
+                        <a:t>Thông tin được chỉnh sửa và lưu vào cơ sở dữ liệu.</a:t>
+                      </a:r>
+                      <a:endParaRPr lang="en-US" sz="1800">
+                        <a:effectLst/>
+                        <a:latin typeface="Times New Roman" panose="02020603050405020304" pitchFamily="18" charset="0"/>
+                        <a:ea typeface="Calibri" panose="020F0502020204030204" pitchFamily="34" charset="0"/>
+                      </a:endParaRPr>
+                    </a:p>
+                  </a:txBody>
+                  <a:tcPr marL="68580" marR="68580" marT="0" marB="0"/>
+                </a:tc>
+                <a:extLst>
+                  <a:ext uri="{0D108BD9-81ED-4DB2-BD59-A6C34878D82A}">
+                    <a16:rowId xmlns:a16="http://schemas.microsoft.com/office/drawing/2014/main" val="2349520489"/>
+                  </a:ext>
+                </a:extLst>
+              </a:tr>
+            </a:tbl>
+          </a:graphicData>
+        </a:graphic>
+      </p:graphicFrame>
+    </p:spTree>
+    <p:extLst>
+      <p:ext uri="{BB962C8B-B14F-4D97-AF65-F5344CB8AC3E}">
+        <p14:creationId xmlns:p14="http://schemas.microsoft.com/office/powerpoint/2010/main" val="3073039478"/>
+      </p:ext>
+    </p:extLst>
+  </p:cSld>
+  <p:clrMapOvr>
+    <a:masterClrMapping/>
+  </p:clrMapOvr>
+</p:sld>
+</file>
+
+<file path=ppt/slides/slide14.xml><?xml version="1.0" encoding="utf-8"?>
+<p:sld xmlns:a="http://schemas.openxmlformats.org/drawingml/2006/main" xmlns:r="http://schemas.openxmlformats.org/officeDocument/2006/relationships" xmlns:p="http://schemas.openxmlformats.org/presentationml/2006/main">
+  <p:cSld>
+    <p:spTree>
+      <p:nvGrpSpPr>
+        <p:cNvPr id="1" name=""/>
+        <p:cNvGrpSpPr/>
+        <p:nvPr/>
+      </p:nvGrpSpPr>
+      <p:grpSpPr>
+        <a:xfrm>
+          <a:off x="0" y="0"/>
+          <a:ext cx="0" cy="0"/>
+          <a:chOff x="0" y="0"/>
+          <a:chExt cx="0" cy="0"/>
+        </a:xfrm>
+      </p:grpSpPr>
+      <p:sp>
+        <p:nvSpPr>
+          <p:cNvPr id="2" name="Title 1">
+            <a:extLst>
+              <a:ext uri="{FF2B5EF4-FFF2-40B4-BE49-F238E27FC236}">
                 <a16:creationId xmlns:a16="http://schemas.microsoft.com/office/drawing/2014/main" id="{26331D5B-BA20-4A09-A896-36B59BC18D8B}"/>
               </a:ext>
             </a:extLst>
@@ -15059,7 +16856,660 @@
 </p:sld>
 </file>
 
-<file path=ppt/slides/slide14.xml><?xml version="1.0" encoding="utf-8"?>
+<file path=ppt/slides/slide15.xml><?xml version="1.0" encoding="utf-8"?>
+<p:sld xmlns:a="http://schemas.openxmlformats.org/drawingml/2006/main" xmlns:r="http://schemas.openxmlformats.org/officeDocument/2006/relationships" xmlns:p="http://schemas.openxmlformats.org/presentationml/2006/main">
+  <p:cSld>
+    <p:spTree>
+      <p:nvGrpSpPr>
+        <p:cNvPr id="1" name=""/>
+        <p:cNvGrpSpPr/>
+        <p:nvPr/>
+      </p:nvGrpSpPr>
+      <p:grpSpPr>
+        <a:xfrm>
+          <a:off x="0" y="0"/>
+          <a:ext cx="0" cy="0"/>
+          <a:chOff x="0" y="0"/>
+          <a:chExt cx="0" cy="0"/>
+        </a:xfrm>
+      </p:grpSpPr>
+      <p:sp>
+        <p:nvSpPr>
+          <p:cNvPr id="2" name="Title 1">
+            <a:extLst>
+              <a:ext uri="{FF2B5EF4-FFF2-40B4-BE49-F238E27FC236}">
+                <a16:creationId xmlns:a16="http://schemas.microsoft.com/office/drawing/2014/main" id="{26331D5B-BA20-4A09-A896-36B59BC18D8B}"/>
+              </a:ext>
+            </a:extLst>
+          </p:cNvPr>
+          <p:cNvSpPr>
+            <a:spLocks noGrp="1"/>
+          </p:cNvSpPr>
+          <p:nvPr>
+            <p:ph type="title"/>
+          </p:nvPr>
+        </p:nvSpPr>
+        <p:spPr>
+          <a:xfrm>
+            <a:off x="1484311" y="685801"/>
+            <a:ext cx="10018713" cy="728330"/>
+          </a:xfrm>
+        </p:spPr>
+        <p:txBody>
+          <a:bodyPr/>
+          <a:lstStyle/>
+          <a:p>
+            <a:pPr algn="l"/>
+            <a:r>
+              <a:rPr lang="en-US"/>
+              <a:t>Sequence Diagram: Chỉnh sửa bài học</a:t>
+            </a:r>
+          </a:p>
+        </p:txBody>
+      </p:sp>
+      <p:pic>
+        <p:nvPicPr>
+          <p:cNvPr id="4" name="Picture 3">
+            <a:extLst>
+              <a:ext uri="{FF2B5EF4-FFF2-40B4-BE49-F238E27FC236}">
+                <a16:creationId xmlns:a16="http://schemas.microsoft.com/office/drawing/2014/main" id="{3766AB98-958C-4178-B60C-0D42531DE96C}"/>
+              </a:ext>
+            </a:extLst>
+          </p:cNvPr>
+          <p:cNvPicPr/>
+          <p:nvPr/>
+        </p:nvPicPr>
+        <p:blipFill>
+          <a:blip r:embed="rId2" cstate="print">
+            <a:extLst>
+              <a:ext uri="{28A0092B-C50C-407E-A947-70E740481C1C}">
+                <a14:useLocalDpi xmlns:a14="http://schemas.microsoft.com/office/drawing/2010/main" val="0"/>
+              </a:ext>
+            </a:extLst>
+          </a:blip>
+          <a:srcRect/>
+          <a:stretch>
+            <a:fillRect/>
+          </a:stretch>
+        </p:blipFill>
+        <p:spPr bwMode="auto">
+          <a:xfrm>
+            <a:off x="2349648" y="1548765"/>
+            <a:ext cx="7492705" cy="5257322"/>
+          </a:xfrm>
+          <a:prstGeom prst="rect">
+            <a:avLst/>
+          </a:prstGeom>
+          <a:noFill/>
+          <a:ln>
+            <a:noFill/>
+          </a:ln>
+        </p:spPr>
+      </p:pic>
+    </p:spTree>
+    <p:extLst>
+      <p:ext uri="{BB962C8B-B14F-4D97-AF65-F5344CB8AC3E}">
+        <p14:creationId xmlns:p14="http://schemas.microsoft.com/office/powerpoint/2010/main" val="4173001914"/>
+      </p:ext>
+    </p:extLst>
+  </p:cSld>
+  <p:clrMapOvr>
+    <a:masterClrMapping/>
+  </p:clrMapOvr>
+</p:sld>
+</file>
+
+<file path=ppt/slides/slide16.xml><?xml version="1.0" encoding="utf-8"?>
+<p:sld xmlns:a="http://schemas.openxmlformats.org/drawingml/2006/main" xmlns:r="http://schemas.openxmlformats.org/officeDocument/2006/relationships" xmlns:p="http://schemas.openxmlformats.org/presentationml/2006/main">
+  <p:cSld>
+    <p:spTree>
+      <p:nvGrpSpPr>
+        <p:cNvPr id="1" name=""/>
+        <p:cNvGrpSpPr/>
+        <p:nvPr/>
+      </p:nvGrpSpPr>
+      <p:grpSpPr>
+        <a:xfrm>
+          <a:off x="0" y="0"/>
+          <a:ext cx="0" cy="0"/>
+          <a:chOff x="0" y="0"/>
+          <a:chExt cx="0" cy="0"/>
+        </a:xfrm>
+      </p:grpSpPr>
+      <p:sp>
+        <p:nvSpPr>
+          <p:cNvPr id="2" name="Title 1">
+            <a:extLst>
+              <a:ext uri="{FF2B5EF4-FFF2-40B4-BE49-F238E27FC236}">
+                <a16:creationId xmlns:a16="http://schemas.microsoft.com/office/drawing/2014/main" id="{26331D5B-BA20-4A09-A896-36B59BC18D8B}"/>
+              </a:ext>
+            </a:extLst>
+          </p:cNvPr>
+          <p:cNvSpPr>
+            <a:spLocks noGrp="1"/>
+          </p:cNvSpPr>
+          <p:nvPr>
+            <p:ph type="title"/>
+          </p:nvPr>
+        </p:nvSpPr>
+        <p:spPr>
+          <a:xfrm>
+            <a:off x="1484311" y="685801"/>
+            <a:ext cx="10018713" cy="728330"/>
+          </a:xfrm>
+        </p:spPr>
+        <p:txBody>
+          <a:bodyPr/>
+          <a:lstStyle/>
+          <a:p>
+            <a:pPr algn="l"/>
+            <a:r>
+              <a:rPr lang="en-US"/>
+              <a:t>Sequence Diagram: Đăng ký tài khoản</a:t>
+            </a:r>
+          </a:p>
+        </p:txBody>
+      </p:sp>
+      <p:pic>
+        <p:nvPicPr>
+          <p:cNvPr id="4" name="Picture 3">
+            <a:extLst>
+              <a:ext uri="{FF2B5EF4-FFF2-40B4-BE49-F238E27FC236}">
+                <a16:creationId xmlns:a16="http://schemas.microsoft.com/office/drawing/2014/main" id="{5A91B76D-C41C-4C56-8688-B56E6ED78A0B}"/>
+              </a:ext>
+            </a:extLst>
+          </p:cNvPr>
+          <p:cNvPicPr/>
+          <p:nvPr/>
+        </p:nvPicPr>
+        <p:blipFill>
+          <a:blip r:embed="rId2">
+            <a:extLst>
+              <a:ext uri="{28A0092B-C50C-407E-A947-70E740481C1C}">
+                <a14:useLocalDpi xmlns:a14="http://schemas.microsoft.com/office/drawing/2010/main" val="0"/>
+              </a:ext>
+            </a:extLst>
+          </a:blip>
+          <a:stretch>
+            <a:fillRect/>
+          </a:stretch>
+        </p:blipFill>
+        <p:spPr>
+          <a:xfrm>
+            <a:off x="2609352" y="1538287"/>
+            <a:ext cx="6973297" cy="4917227"/>
+          </a:xfrm>
+          <a:prstGeom prst="rect">
+            <a:avLst/>
+          </a:prstGeom>
+        </p:spPr>
+      </p:pic>
+    </p:spTree>
+    <p:extLst>
+      <p:ext uri="{BB962C8B-B14F-4D97-AF65-F5344CB8AC3E}">
+        <p14:creationId xmlns:p14="http://schemas.microsoft.com/office/powerpoint/2010/main" val="4073534036"/>
+      </p:ext>
+    </p:extLst>
+  </p:cSld>
+  <p:clrMapOvr>
+    <a:masterClrMapping/>
+  </p:clrMapOvr>
+</p:sld>
+</file>
+
+<file path=ppt/slides/slide17.xml><?xml version="1.0" encoding="utf-8"?>
+<p:sld xmlns:a="http://schemas.openxmlformats.org/drawingml/2006/main" xmlns:r="http://schemas.openxmlformats.org/officeDocument/2006/relationships" xmlns:p="http://schemas.openxmlformats.org/presentationml/2006/main">
+  <p:cSld>
+    <p:spTree>
+      <p:nvGrpSpPr>
+        <p:cNvPr id="1" name=""/>
+        <p:cNvGrpSpPr/>
+        <p:nvPr/>
+      </p:nvGrpSpPr>
+      <p:grpSpPr>
+        <a:xfrm>
+          <a:off x="0" y="0"/>
+          <a:ext cx="0" cy="0"/>
+          <a:chOff x="0" y="0"/>
+          <a:chExt cx="0" cy="0"/>
+        </a:xfrm>
+      </p:grpSpPr>
+      <p:sp>
+        <p:nvSpPr>
+          <p:cNvPr id="2" name="Title 1">
+            <a:extLst>
+              <a:ext uri="{FF2B5EF4-FFF2-40B4-BE49-F238E27FC236}">
+                <a16:creationId xmlns:a16="http://schemas.microsoft.com/office/drawing/2014/main" id="{26331D5B-BA20-4A09-A896-36B59BC18D8B}"/>
+              </a:ext>
+            </a:extLst>
+          </p:cNvPr>
+          <p:cNvSpPr>
+            <a:spLocks noGrp="1"/>
+          </p:cNvSpPr>
+          <p:nvPr>
+            <p:ph type="title"/>
+          </p:nvPr>
+        </p:nvSpPr>
+        <p:spPr>
+          <a:xfrm>
+            <a:off x="1484311" y="685801"/>
+            <a:ext cx="10018713" cy="728330"/>
+          </a:xfrm>
+        </p:spPr>
+        <p:txBody>
+          <a:bodyPr/>
+          <a:lstStyle/>
+          <a:p>
+            <a:pPr algn="l"/>
+            <a:r>
+              <a:rPr lang="en-US"/>
+              <a:t>Sequence Diagram: Đăng nhập</a:t>
+            </a:r>
+          </a:p>
+        </p:txBody>
+      </p:sp>
+      <p:pic>
+        <p:nvPicPr>
+          <p:cNvPr id="5" name="Picture 4">
+            <a:extLst>
+              <a:ext uri="{FF2B5EF4-FFF2-40B4-BE49-F238E27FC236}">
+                <a16:creationId xmlns:a16="http://schemas.microsoft.com/office/drawing/2014/main" id="{7AAFF4B8-B6B6-4030-AAF4-F6B196DB3C29}"/>
+              </a:ext>
+            </a:extLst>
+          </p:cNvPr>
+          <p:cNvPicPr/>
+          <p:nvPr/>
+        </p:nvPicPr>
+        <p:blipFill>
+          <a:blip r:embed="rId2">
+            <a:extLst>
+              <a:ext uri="{28A0092B-C50C-407E-A947-70E740481C1C}">
+                <a14:useLocalDpi xmlns:a14="http://schemas.microsoft.com/office/drawing/2010/main" val="0"/>
+              </a:ext>
+            </a:extLst>
+          </a:blip>
+          <a:stretch>
+            <a:fillRect/>
+          </a:stretch>
+        </p:blipFill>
+        <p:spPr>
+          <a:xfrm>
+            <a:off x="2033255" y="1681162"/>
+            <a:ext cx="8125490" cy="4937177"/>
+          </a:xfrm>
+          <a:prstGeom prst="rect">
+            <a:avLst/>
+          </a:prstGeom>
+        </p:spPr>
+      </p:pic>
+    </p:spTree>
+    <p:extLst>
+      <p:ext uri="{BB962C8B-B14F-4D97-AF65-F5344CB8AC3E}">
+        <p14:creationId xmlns:p14="http://schemas.microsoft.com/office/powerpoint/2010/main" val="795160889"/>
+      </p:ext>
+    </p:extLst>
+  </p:cSld>
+  <p:clrMapOvr>
+    <a:masterClrMapping/>
+  </p:clrMapOvr>
+</p:sld>
+</file>
+
+<file path=ppt/slides/slide18.xml><?xml version="1.0" encoding="utf-8"?>
+<p:sld xmlns:a="http://schemas.openxmlformats.org/drawingml/2006/main" xmlns:r="http://schemas.openxmlformats.org/officeDocument/2006/relationships" xmlns:p="http://schemas.openxmlformats.org/presentationml/2006/main">
+  <p:cSld>
+    <p:spTree>
+      <p:nvGrpSpPr>
+        <p:cNvPr id="1" name=""/>
+        <p:cNvGrpSpPr/>
+        <p:nvPr/>
+      </p:nvGrpSpPr>
+      <p:grpSpPr>
+        <a:xfrm>
+          <a:off x="0" y="0"/>
+          <a:ext cx="0" cy="0"/>
+          <a:chOff x="0" y="0"/>
+          <a:chExt cx="0" cy="0"/>
+        </a:xfrm>
+      </p:grpSpPr>
+      <p:sp>
+        <p:nvSpPr>
+          <p:cNvPr id="2" name="Title 1">
+            <a:extLst>
+              <a:ext uri="{FF2B5EF4-FFF2-40B4-BE49-F238E27FC236}">
+                <a16:creationId xmlns:a16="http://schemas.microsoft.com/office/drawing/2014/main" id="{26331D5B-BA20-4A09-A896-36B59BC18D8B}"/>
+              </a:ext>
+            </a:extLst>
+          </p:cNvPr>
+          <p:cNvSpPr>
+            <a:spLocks noGrp="1"/>
+          </p:cNvSpPr>
+          <p:nvPr>
+            <p:ph type="title"/>
+          </p:nvPr>
+        </p:nvSpPr>
+        <p:spPr>
+          <a:xfrm>
+            <a:off x="1484311" y="685801"/>
+            <a:ext cx="10018713" cy="728330"/>
+          </a:xfrm>
+        </p:spPr>
+        <p:txBody>
+          <a:bodyPr/>
+          <a:lstStyle/>
+          <a:p>
+            <a:pPr algn="l"/>
+            <a:r>
+              <a:rPr lang="en-US"/>
+              <a:t>Sequence Diagram: Làm bài kiểm tra</a:t>
+            </a:r>
+          </a:p>
+        </p:txBody>
+      </p:sp>
+      <p:pic>
+        <p:nvPicPr>
+          <p:cNvPr id="6" name="Picture 5">
+            <a:extLst>
+              <a:ext uri="{FF2B5EF4-FFF2-40B4-BE49-F238E27FC236}">
+                <a16:creationId xmlns:a16="http://schemas.microsoft.com/office/drawing/2014/main" id="{892D81DB-FF84-49DB-BB79-4945DAA916BC}"/>
+              </a:ext>
+            </a:extLst>
+          </p:cNvPr>
+          <p:cNvPicPr/>
+          <p:nvPr/>
+        </p:nvPicPr>
+        <p:blipFill>
+          <a:blip r:embed="rId3">
+            <a:extLst>
+              <a:ext uri="{28A0092B-C50C-407E-A947-70E740481C1C}">
+                <a14:useLocalDpi xmlns:a14="http://schemas.microsoft.com/office/drawing/2010/main" val="0"/>
+              </a:ext>
+            </a:extLst>
+          </a:blip>
+          <a:stretch>
+            <a:fillRect/>
+          </a:stretch>
+        </p:blipFill>
+        <p:spPr>
+          <a:xfrm>
+            <a:off x="1932128" y="1920240"/>
+            <a:ext cx="8327744" cy="4703844"/>
+          </a:xfrm>
+          <a:prstGeom prst="rect">
+            <a:avLst/>
+          </a:prstGeom>
+        </p:spPr>
+      </p:pic>
+    </p:spTree>
+    <p:extLst>
+      <p:ext uri="{BB962C8B-B14F-4D97-AF65-F5344CB8AC3E}">
+        <p14:creationId xmlns:p14="http://schemas.microsoft.com/office/powerpoint/2010/main" val="4069680054"/>
+      </p:ext>
+    </p:extLst>
+  </p:cSld>
+  <p:clrMapOvr>
+    <a:masterClrMapping/>
+  </p:clrMapOvr>
+</p:sld>
+</file>
+
+<file path=ppt/slides/slide19.xml><?xml version="1.0" encoding="utf-8"?>
+<p:sld xmlns:a="http://schemas.openxmlformats.org/drawingml/2006/main" xmlns:r="http://schemas.openxmlformats.org/officeDocument/2006/relationships" xmlns:p="http://schemas.openxmlformats.org/presentationml/2006/main">
+  <p:cSld>
+    <p:spTree>
+      <p:nvGrpSpPr>
+        <p:cNvPr id="1" name=""/>
+        <p:cNvGrpSpPr/>
+        <p:nvPr/>
+      </p:nvGrpSpPr>
+      <p:grpSpPr>
+        <a:xfrm>
+          <a:off x="0" y="0"/>
+          <a:ext cx="0" cy="0"/>
+          <a:chOff x="0" y="0"/>
+          <a:chExt cx="0" cy="0"/>
+        </a:xfrm>
+      </p:grpSpPr>
+      <p:sp>
+        <p:nvSpPr>
+          <p:cNvPr id="2" name="Title 1">
+            <a:extLst>
+              <a:ext uri="{FF2B5EF4-FFF2-40B4-BE49-F238E27FC236}">
+                <a16:creationId xmlns:a16="http://schemas.microsoft.com/office/drawing/2014/main" id="{26331D5B-BA20-4A09-A896-36B59BC18D8B}"/>
+              </a:ext>
+            </a:extLst>
+          </p:cNvPr>
+          <p:cNvSpPr>
+            <a:spLocks noGrp="1"/>
+          </p:cNvSpPr>
+          <p:nvPr>
+            <p:ph type="title"/>
+          </p:nvPr>
+        </p:nvSpPr>
+        <p:spPr>
+          <a:xfrm>
+            <a:off x="1484311" y="685801"/>
+            <a:ext cx="10018713" cy="728330"/>
+          </a:xfrm>
+        </p:spPr>
+        <p:txBody>
+          <a:bodyPr/>
+          <a:lstStyle/>
+          <a:p>
+            <a:pPr algn="l"/>
+            <a:r>
+              <a:rPr lang="en-US"/>
+              <a:t>Sequence Diagram: Quản lý tài khoản</a:t>
+            </a:r>
+          </a:p>
+        </p:txBody>
+      </p:sp>
+      <p:pic>
+        <p:nvPicPr>
+          <p:cNvPr id="4" name="Picture 3">
+            <a:extLst>
+              <a:ext uri="{FF2B5EF4-FFF2-40B4-BE49-F238E27FC236}">
+                <a16:creationId xmlns:a16="http://schemas.microsoft.com/office/drawing/2014/main" id="{05EC9DF1-79B9-4F05-97F6-18A73376A6B9}"/>
+              </a:ext>
+            </a:extLst>
+          </p:cNvPr>
+          <p:cNvPicPr/>
+          <p:nvPr/>
+        </p:nvPicPr>
+        <p:blipFill>
+          <a:blip r:embed="rId3">
+            <a:extLst>
+              <a:ext uri="{28A0092B-C50C-407E-A947-70E740481C1C}">
+                <a14:useLocalDpi xmlns:a14="http://schemas.microsoft.com/office/drawing/2010/main" val="0"/>
+              </a:ext>
+            </a:extLst>
+          </a:blip>
+          <a:stretch>
+            <a:fillRect/>
+          </a:stretch>
+        </p:blipFill>
+        <p:spPr>
+          <a:xfrm>
+            <a:off x="3621575" y="1536700"/>
+            <a:ext cx="4948850" cy="3403548"/>
+          </a:xfrm>
+          <a:prstGeom prst="rect">
+            <a:avLst/>
+          </a:prstGeom>
+        </p:spPr>
+      </p:pic>
+      <p:pic>
+        <p:nvPicPr>
+          <p:cNvPr id="5" name="Picture 4">
+            <a:extLst>
+              <a:ext uri="{FF2B5EF4-FFF2-40B4-BE49-F238E27FC236}">
+                <a16:creationId xmlns:a16="http://schemas.microsoft.com/office/drawing/2014/main" id="{99A6E851-61EF-4967-9ABE-3B2368B4CA57}"/>
+              </a:ext>
+            </a:extLst>
+          </p:cNvPr>
+          <p:cNvPicPr/>
+          <p:nvPr/>
+        </p:nvPicPr>
+        <p:blipFill>
+          <a:blip r:embed="rId4">
+            <a:extLst>
+              <a:ext uri="{28A0092B-C50C-407E-A947-70E740481C1C}">
+                <a14:useLocalDpi xmlns:a14="http://schemas.microsoft.com/office/drawing/2010/main" val="0"/>
+              </a:ext>
+            </a:extLst>
+          </a:blip>
+          <a:stretch>
+            <a:fillRect/>
+          </a:stretch>
+        </p:blipFill>
+        <p:spPr>
+          <a:xfrm>
+            <a:off x="3621575" y="4940248"/>
+            <a:ext cx="4948850" cy="1656512"/>
+          </a:xfrm>
+          <a:prstGeom prst="rect">
+            <a:avLst/>
+          </a:prstGeom>
+        </p:spPr>
+      </p:pic>
+    </p:spTree>
+    <p:extLst>
+      <p:ext uri="{BB962C8B-B14F-4D97-AF65-F5344CB8AC3E}">
+        <p14:creationId xmlns:p14="http://schemas.microsoft.com/office/powerpoint/2010/main" val="4066355671"/>
+      </p:ext>
+    </p:extLst>
+  </p:cSld>
+  <p:clrMapOvr>
+    <a:masterClrMapping/>
+  </p:clrMapOvr>
+</p:sld>
+</file>
+
+<file path=ppt/slides/slide2.xml><?xml version="1.0" encoding="utf-8"?>
+<p:sld xmlns:a="http://schemas.openxmlformats.org/drawingml/2006/main" xmlns:r="http://schemas.openxmlformats.org/officeDocument/2006/relationships" xmlns:p="http://schemas.openxmlformats.org/presentationml/2006/main">
+  <p:cSld>
+    <p:spTree>
+      <p:nvGrpSpPr>
+        <p:cNvPr id="1" name=""/>
+        <p:cNvGrpSpPr/>
+        <p:nvPr/>
+      </p:nvGrpSpPr>
+      <p:grpSpPr>
+        <a:xfrm>
+          <a:off x="0" y="0"/>
+          <a:ext cx="0" cy="0"/>
+          <a:chOff x="0" y="0"/>
+          <a:chExt cx="0" cy="0"/>
+        </a:xfrm>
+      </p:grpSpPr>
+      <p:sp>
+        <p:nvSpPr>
+          <p:cNvPr id="4" name="TextBox 3">
+            <a:extLst>
+              <a:ext uri="{FF2B5EF4-FFF2-40B4-BE49-F238E27FC236}">
+                <a16:creationId xmlns:a16="http://schemas.microsoft.com/office/drawing/2014/main" id="{B78FD0C1-8AC2-4D62-B2E9-5BF21A2A1358}"/>
+              </a:ext>
+            </a:extLst>
+          </p:cNvPr>
+          <p:cNvSpPr txBox="1"/>
+          <p:nvPr/>
+        </p:nvSpPr>
+        <p:spPr>
+          <a:xfrm>
+            <a:off x="2343705" y="1278384"/>
+            <a:ext cx="7306322" cy="369332"/>
+          </a:xfrm>
+          <a:prstGeom prst="rect">
+            <a:avLst/>
+          </a:prstGeom>
+          <a:noFill/>
+        </p:spPr>
+        <p:txBody>
+          <a:bodyPr wrap="square" rtlCol="0">
+            <a:spAutoFit/>
+          </a:bodyPr>
+          <a:lstStyle/>
+          <a:p>
+            <a:r>
+              <a:rPr lang="en-US">
+                <a:latin typeface="Arial" panose="020B0604020202020204" pitchFamily="34" charset="0"/>
+                <a:cs typeface="Arial" panose="020B0604020202020204" pitchFamily="34" charset="0"/>
+              </a:rPr>
+              <a:t>1. Yêu cầu:</a:t>
+            </a:r>
+          </a:p>
+        </p:txBody>
+      </p:sp>
+      <p:sp>
+        <p:nvSpPr>
+          <p:cNvPr id="5" name="TextBox 4">
+            <a:extLst>
+              <a:ext uri="{FF2B5EF4-FFF2-40B4-BE49-F238E27FC236}">
+                <a16:creationId xmlns:a16="http://schemas.microsoft.com/office/drawing/2014/main" id="{0BF8ED3A-1DDD-4430-BC3C-8DC3392A9DEA}"/>
+              </a:ext>
+            </a:extLst>
+          </p:cNvPr>
+          <p:cNvSpPr txBox="1"/>
+          <p:nvPr/>
+        </p:nvSpPr>
+        <p:spPr>
+          <a:xfrm>
+            <a:off x="2343705" y="2352583"/>
+            <a:ext cx="9430851" cy="923330"/>
+          </a:xfrm>
+          <a:prstGeom prst="rect">
+            <a:avLst/>
+          </a:prstGeom>
+          <a:noFill/>
+        </p:spPr>
+        <p:txBody>
+          <a:bodyPr wrap="none" rtlCol="0">
+            <a:spAutoFit/>
+          </a:bodyPr>
+          <a:lstStyle/>
+          <a:p>
+            <a:r>
+              <a:rPr lang="en-US">
+                <a:latin typeface="Arial" panose="020B0604020202020204" pitchFamily="34" charset="0"/>
+                <a:cs typeface="Arial" panose="020B0604020202020204" pitchFamily="34" charset="0"/>
+              </a:rPr>
+              <a:t>Làm một website học tiếng Anh dành cho lứa tuổi 5-10 tuổi, theo chủ đề gia đình, động vật</a:t>
+            </a:r>
+          </a:p>
+          <a:p>
+            <a:r>
+              <a:rPr lang="en-US">
+                <a:latin typeface="Arial" panose="020B0604020202020204" pitchFamily="34" charset="0"/>
+                <a:cs typeface="Arial" panose="020B0604020202020204" pitchFamily="34" charset="0"/>
+              </a:rPr>
+              <a:t>cây cối.</a:t>
+            </a:r>
+          </a:p>
+          <a:p>
+            <a:r>
+              <a:rPr lang="en-US">
+                <a:latin typeface="Arial" panose="020B0604020202020204" pitchFamily="34" charset="0"/>
+                <a:cs typeface="Arial" panose="020B0604020202020204" pitchFamily="34" charset="0"/>
+              </a:rPr>
+              <a:t>Có các bài học, kèm bài tập nhỏ theo từng bài học và bài tập lớn theo từng chủ đề.</a:t>
+            </a:r>
+          </a:p>
+        </p:txBody>
+      </p:sp>
+    </p:spTree>
+    <p:extLst>
+      <p:ext uri="{BB962C8B-B14F-4D97-AF65-F5344CB8AC3E}">
+        <p14:creationId xmlns:p14="http://schemas.microsoft.com/office/powerpoint/2010/main" val="208499803"/>
+      </p:ext>
+    </p:extLst>
+  </p:cSld>
+  <p:clrMapOvr>
+    <a:masterClrMapping/>
+  </p:clrMapOvr>
+</p:sld>
+</file>
+
+<file path=ppt/slides/slide20.xml><?xml version="1.0" encoding="utf-8"?>
 <p:sld xmlns:a="http://schemas.openxmlformats.org/drawingml/2006/main" xmlns:r="http://schemas.openxmlformats.org/officeDocument/2006/relationships" xmlns:p="http://schemas.openxmlformats.org/presentationml/2006/main">
   <p:cSld>
     <p:spTree>
@@ -15159,7 +17609,399 @@
 </p:sld>
 </file>
 
-<file path=ppt/slides/slide15.xml><?xml version="1.0" encoding="utf-8"?>
+<file path=ppt/slides/slide21.xml><?xml version="1.0" encoding="utf-8"?>
+<p:sld xmlns:a="http://schemas.openxmlformats.org/drawingml/2006/main" xmlns:r="http://schemas.openxmlformats.org/officeDocument/2006/relationships" xmlns:p="http://schemas.openxmlformats.org/presentationml/2006/main">
+  <p:cSld>
+    <p:spTree>
+      <p:nvGrpSpPr>
+        <p:cNvPr id="1" name=""/>
+        <p:cNvGrpSpPr/>
+        <p:nvPr/>
+      </p:nvGrpSpPr>
+      <p:grpSpPr>
+        <a:xfrm>
+          <a:off x="0" y="0"/>
+          <a:ext cx="0" cy="0"/>
+          <a:chOff x="0" y="0"/>
+          <a:chExt cx="0" cy="0"/>
+        </a:xfrm>
+      </p:grpSpPr>
+      <p:sp>
+        <p:nvSpPr>
+          <p:cNvPr id="2" name="Title 1">
+            <a:extLst>
+              <a:ext uri="{FF2B5EF4-FFF2-40B4-BE49-F238E27FC236}">
+                <a16:creationId xmlns:a16="http://schemas.microsoft.com/office/drawing/2014/main" id="{B325062B-B27C-4192-BE37-BF9D35B41B20}"/>
+              </a:ext>
+            </a:extLst>
+          </p:cNvPr>
+          <p:cNvSpPr>
+            <a:spLocks noGrp="1"/>
+          </p:cNvSpPr>
+          <p:nvPr>
+            <p:ph type="title"/>
+          </p:nvPr>
+        </p:nvSpPr>
+        <p:spPr>
+          <a:xfrm>
+            <a:off x="1484311" y="685800"/>
+            <a:ext cx="10018713" cy="866553"/>
+          </a:xfrm>
+        </p:spPr>
+        <p:txBody>
+          <a:bodyPr/>
+          <a:lstStyle/>
+          <a:p>
+            <a:pPr algn="l"/>
+            <a:r>
+              <a:rPr lang="en-US"/>
+              <a:t>Class diagram: Đăng ký</a:t>
+            </a:r>
+          </a:p>
+        </p:txBody>
+      </p:sp>
+      <p:pic>
+        <p:nvPicPr>
+          <p:cNvPr id="5" name="Picture 4">
+            <a:extLst>
+              <a:ext uri="{FF2B5EF4-FFF2-40B4-BE49-F238E27FC236}">
+                <a16:creationId xmlns:a16="http://schemas.microsoft.com/office/drawing/2014/main" id="{8F185E19-CC12-43CB-A8BD-AEBF1020ECEB}"/>
+              </a:ext>
+            </a:extLst>
+          </p:cNvPr>
+          <p:cNvPicPr/>
+          <p:nvPr/>
+        </p:nvPicPr>
+        <p:blipFill>
+          <a:blip r:embed="rId3">
+            <a:extLst>
+              <a:ext uri="{28A0092B-C50C-407E-A947-70E740481C1C}">
+                <a14:useLocalDpi xmlns:a14="http://schemas.microsoft.com/office/drawing/2010/main" val="0"/>
+              </a:ext>
+            </a:extLst>
+          </a:blip>
+          <a:stretch>
+            <a:fillRect/>
+          </a:stretch>
+        </p:blipFill>
+        <p:spPr>
+          <a:xfrm>
+            <a:off x="2411831" y="2181225"/>
+            <a:ext cx="7368338" cy="4357798"/>
+          </a:xfrm>
+          <a:prstGeom prst="rect">
+            <a:avLst/>
+          </a:prstGeom>
+        </p:spPr>
+      </p:pic>
+    </p:spTree>
+    <p:extLst>
+      <p:ext uri="{BB962C8B-B14F-4D97-AF65-F5344CB8AC3E}">
+        <p14:creationId xmlns:p14="http://schemas.microsoft.com/office/powerpoint/2010/main" val="2184519649"/>
+      </p:ext>
+    </p:extLst>
+  </p:cSld>
+  <p:clrMapOvr>
+    <a:masterClrMapping/>
+  </p:clrMapOvr>
+</p:sld>
+</file>
+
+<file path=ppt/slides/slide22.xml><?xml version="1.0" encoding="utf-8"?>
+<p:sld xmlns:a="http://schemas.openxmlformats.org/drawingml/2006/main" xmlns:r="http://schemas.openxmlformats.org/officeDocument/2006/relationships" xmlns:p="http://schemas.openxmlformats.org/presentationml/2006/main">
+  <p:cSld>
+    <p:spTree>
+      <p:nvGrpSpPr>
+        <p:cNvPr id="1" name=""/>
+        <p:cNvGrpSpPr/>
+        <p:nvPr/>
+      </p:nvGrpSpPr>
+      <p:grpSpPr>
+        <a:xfrm>
+          <a:off x="0" y="0"/>
+          <a:ext cx="0" cy="0"/>
+          <a:chOff x="0" y="0"/>
+          <a:chExt cx="0" cy="0"/>
+        </a:xfrm>
+      </p:grpSpPr>
+      <p:sp>
+        <p:nvSpPr>
+          <p:cNvPr id="2" name="Title 1">
+            <a:extLst>
+              <a:ext uri="{FF2B5EF4-FFF2-40B4-BE49-F238E27FC236}">
+                <a16:creationId xmlns:a16="http://schemas.microsoft.com/office/drawing/2014/main" id="{B325062B-B27C-4192-BE37-BF9D35B41B20}"/>
+              </a:ext>
+            </a:extLst>
+          </p:cNvPr>
+          <p:cNvSpPr>
+            <a:spLocks noGrp="1"/>
+          </p:cNvSpPr>
+          <p:nvPr>
+            <p:ph type="title"/>
+          </p:nvPr>
+        </p:nvSpPr>
+        <p:spPr>
+          <a:xfrm>
+            <a:off x="1484311" y="685800"/>
+            <a:ext cx="10018713" cy="866553"/>
+          </a:xfrm>
+        </p:spPr>
+        <p:txBody>
+          <a:bodyPr/>
+          <a:lstStyle/>
+          <a:p>
+            <a:pPr algn="l"/>
+            <a:r>
+              <a:rPr lang="en-US"/>
+              <a:t>Class diagram: Đăng nhập</a:t>
+            </a:r>
+          </a:p>
+        </p:txBody>
+      </p:sp>
+      <p:pic>
+        <p:nvPicPr>
+          <p:cNvPr id="4" name="Picture 3">
+            <a:extLst>
+              <a:ext uri="{FF2B5EF4-FFF2-40B4-BE49-F238E27FC236}">
+                <a16:creationId xmlns:a16="http://schemas.microsoft.com/office/drawing/2014/main" id="{55E9D5A9-AEC3-4163-8B1C-7B886065FDD3}"/>
+              </a:ext>
+            </a:extLst>
+          </p:cNvPr>
+          <p:cNvPicPr/>
+          <p:nvPr/>
+        </p:nvPicPr>
+        <p:blipFill>
+          <a:blip r:embed="rId3">
+            <a:extLst>
+              <a:ext uri="{28A0092B-C50C-407E-A947-70E740481C1C}">
+                <a14:useLocalDpi xmlns:a14="http://schemas.microsoft.com/office/drawing/2010/main" val="0"/>
+              </a:ext>
+            </a:extLst>
+          </a:blip>
+          <a:stretch>
+            <a:fillRect/>
+          </a:stretch>
+        </p:blipFill>
+        <p:spPr>
+          <a:xfrm>
+            <a:off x="2508896" y="2082482"/>
+            <a:ext cx="7174208" cy="4324921"/>
+          </a:xfrm>
+          <a:prstGeom prst="rect">
+            <a:avLst/>
+          </a:prstGeom>
+        </p:spPr>
+      </p:pic>
+    </p:spTree>
+    <p:extLst>
+      <p:ext uri="{BB962C8B-B14F-4D97-AF65-F5344CB8AC3E}">
+        <p14:creationId xmlns:p14="http://schemas.microsoft.com/office/powerpoint/2010/main" val="3722838263"/>
+      </p:ext>
+    </p:extLst>
+  </p:cSld>
+  <p:clrMapOvr>
+    <a:masterClrMapping/>
+  </p:clrMapOvr>
+</p:sld>
+</file>
+
+<file path=ppt/slides/slide23.xml><?xml version="1.0" encoding="utf-8"?>
+<p:sld xmlns:a="http://schemas.openxmlformats.org/drawingml/2006/main" xmlns:r="http://schemas.openxmlformats.org/officeDocument/2006/relationships" xmlns:p="http://schemas.openxmlformats.org/presentationml/2006/main">
+  <p:cSld>
+    <p:spTree>
+      <p:nvGrpSpPr>
+        <p:cNvPr id="1" name=""/>
+        <p:cNvGrpSpPr/>
+        <p:nvPr/>
+      </p:nvGrpSpPr>
+      <p:grpSpPr>
+        <a:xfrm>
+          <a:off x="0" y="0"/>
+          <a:ext cx="0" cy="0"/>
+          <a:chOff x="0" y="0"/>
+          <a:chExt cx="0" cy="0"/>
+        </a:xfrm>
+      </p:grpSpPr>
+      <p:sp>
+        <p:nvSpPr>
+          <p:cNvPr id="2" name="Title 1">
+            <a:extLst>
+              <a:ext uri="{FF2B5EF4-FFF2-40B4-BE49-F238E27FC236}">
+                <a16:creationId xmlns:a16="http://schemas.microsoft.com/office/drawing/2014/main" id="{B325062B-B27C-4192-BE37-BF9D35B41B20}"/>
+              </a:ext>
+            </a:extLst>
+          </p:cNvPr>
+          <p:cNvSpPr>
+            <a:spLocks noGrp="1"/>
+          </p:cNvSpPr>
+          <p:nvPr>
+            <p:ph type="title"/>
+          </p:nvPr>
+        </p:nvSpPr>
+        <p:spPr>
+          <a:xfrm>
+            <a:off x="1484311" y="685800"/>
+            <a:ext cx="10018713" cy="866553"/>
+          </a:xfrm>
+        </p:spPr>
+        <p:txBody>
+          <a:bodyPr/>
+          <a:lstStyle/>
+          <a:p>
+            <a:pPr algn="l"/>
+            <a:r>
+              <a:rPr lang="en-US"/>
+              <a:t>Class diagram: Làm bài test</a:t>
+            </a:r>
+          </a:p>
+        </p:txBody>
+      </p:sp>
+      <p:pic>
+        <p:nvPicPr>
+          <p:cNvPr id="5" name="Picture 4">
+            <a:extLst>
+              <a:ext uri="{FF2B5EF4-FFF2-40B4-BE49-F238E27FC236}">
+                <a16:creationId xmlns:a16="http://schemas.microsoft.com/office/drawing/2014/main" id="{24BA7500-2CFD-4D8C-9003-B4B44521AB65}"/>
+              </a:ext>
+            </a:extLst>
+          </p:cNvPr>
+          <p:cNvPicPr/>
+          <p:nvPr/>
+        </p:nvPicPr>
+        <p:blipFill>
+          <a:blip r:embed="rId3">
+            <a:extLst>
+              <a:ext uri="{28A0092B-C50C-407E-A947-70E740481C1C}">
+                <a14:useLocalDpi xmlns:a14="http://schemas.microsoft.com/office/drawing/2010/main" val="0"/>
+              </a:ext>
+            </a:extLst>
+          </a:blip>
+          <a:stretch>
+            <a:fillRect/>
+          </a:stretch>
+        </p:blipFill>
+        <p:spPr>
+          <a:xfrm>
+            <a:off x="1985531" y="2303145"/>
+            <a:ext cx="8220938" cy="3459702"/>
+          </a:xfrm>
+          <a:prstGeom prst="rect">
+            <a:avLst/>
+          </a:prstGeom>
+        </p:spPr>
+      </p:pic>
+    </p:spTree>
+    <p:extLst>
+      <p:ext uri="{BB962C8B-B14F-4D97-AF65-F5344CB8AC3E}">
+        <p14:creationId xmlns:p14="http://schemas.microsoft.com/office/powerpoint/2010/main" val="1937824344"/>
+      </p:ext>
+    </p:extLst>
+  </p:cSld>
+  <p:clrMapOvr>
+    <a:masterClrMapping/>
+  </p:clrMapOvr>
+</p:sld>
+</file>
+
+<file path=ppt/slides/slide24.xml><?xml version="1.0" encoding="utf-8"?>
+<p:sld xmlns:a="http://schemas.openxmlformats.org/drawingml/2006/main" xmlns:r="http://schemas.openxmlformats.org/officeDocument/2006/relationships" xmlns:p="http://schemas.openxmlformats.org/presentationml/2006/main">
+  <p:cSld>
+    <p:spTree>
+      <p:nvGrpSpPr>
+        <p:cNvPr id="1" name=""/>
+        <p:cNvGrpSpPr/>
+        <p:nvPr/>
+      </p:nvGrpSpPr>
+      <p:grpSpPr>
+        <a:xfrm>
+          <a:off x="0" y="0"/>
+          <a:ext cx="0" cy="0"/>
+          <a:chOff x="0" y="0"/>
+          <a:chExt cx="0" cy="0"/>
+        </a:xfrm>
+      </p:grpSpPr>
+      <p:sp>
+        <p:nvSpPr>
+          <p:cNvPr id="2" name="Title 1">
+            <a:extLst>
+              <a:ext uri="{FF2B5EF4-FFF2-40B4-BE49-F238E27FC236}">
+                <a16:creationId xmlns:a16="http://schemas.microsoft.com/office/drawing/2014/main" id="{B325062B-B27C-4192-BE37-BF9D35B41B20}"/>
+              </a:ext>
+            </a:extLst>
+          </p:cNvPr>
+          <p:cNvSpPr>
+            <a:spLocks noGrp="1"/>
+          </p:cNvSpPr>
+          <p:nvPr>
+            <p:ph type="title"/>
+          </p:nvPr>
+        </p:nvSpPr>
+        <p:spPr>
+          <a:xfrm>
+            <a:off x="1484311" y="685800"/>
+            <a:ext cx="10018713" cy="866553"/>
+          </a:xfrm>
+        </p:spPr>
+        <p:txBody>
+          <a:bodyPr/>
+          <a:lstStyle/>
+          <a:p>
+            <a:pPr algn="l"/>
+            <a:r>
+              <a:rPr lang="en-US"/>
+              <a:t>Class diagram: Quản lý tài khoản</a:t>
+            </a:r>
+          </a:p>
+        </p:txBody>
+      </p:sp>
+      <p:pic>
+        <p:nvPicPr>
+          <p:cNvPr id="4" name="Picture 3">
+            <a:extLst>
+              <a:ext uri="{FF2B5EF4-FFF2-40B4-BE49-F238E27FC236}">
+                <a16:creationId xmlns:a16="http://schemas.microsoft.com/office/drawing/2014/main" id="{B7147EB6-503A-4686-BDD5-70241FDFFB30}"/>
+              </a:ext>
+            </a:extLst>
+          </p:cNvPr>
+          <p:cNvPicPr/>
+          <p:nvPr/>
+        </p:nvPicPr>
+        <p:blipFill>
+          <a:blip r:embed="rId3">
+            <a:extLst>
+              <a:ext uri="{28A0092B-C50C-407E-A947-70E740481C1C}">
+                <a14:useLocalDpi xmlns:a14="http://schemas.microsoft.com/office/drawing/2010/main" val="0"/>
+              </a:ext>
+            </a:extLst>
+          </a:blip>
+          <a:stretch>
+            <a:fillRect/>
+          </a:stretch>
+        </p:blipFill>
+        <p:spPr>
+          <a:xfrm>
+            <a:off x="2252733" y="1983104"/>
+            <a:ext cx="7686535" cy="4268839"/>
+          </a:xfrm>
+          <a:prstGeom prst="rect">
+            <a:avLst/>
+          </a:prstGeom>
+        </p:spPr>
+      </p:pic>
+    </p:spTree>
+    <p:extLst>
+      <p:ext uri="{BB962C8B-B14F-4D97-AF65-F5344CB8AC3E}">
+        <p14:creationId xmlns:p14="http://schemas.microsoft.com/office/powerpoint/2010/main" val="4294113957"/>
+      </p:ext>
+    </p:extLst>
+  </p:cSld>
+  <p:clrMapOvr>
+    <a:masterClrMapping/>
+  </p:clrMapOvr>
+</p:sld>
+</file>
+
+<file path=ppt/slides/slide25.xml><?xml version="1.0" encoding="utf-8"?>
 <p:sld xmlns:a="http://schemas.openxmlformats.org/drawingml/2006/main" xmlns:r="http://schemas.openxmlformats.org/officeDocument/2006/relationships" xmlns:p="http://schemas.openxmlformats.org/presentationml/2006/main">
   <p:cSld>
     <p:spTree>
@@ -15305,7 +18147,7 @@
 </p:sld>
 </file>
 
-<file path=ppt/slides/slide16.xml><?xml version="1.0" encoding="utf-8"?>
+<file path=ppt/slides/slide26.xml><?xml version="1.0" encoding="utf-8"?>
 <p:sld xmlns:a="http://schemas.openxmlformats.org/drawingml/2006/main" xmlns:r="http://schemas.openxmlformats.org/officeDocument/2006/relationships" xmlns:p="http://schemas.openxmlformats.org/presentationml/2006/main">
   <p:cSld>
     <p:spTree>
@@ -15399,7 +18241,7 @@
 </p:sld>
 </file>
 
-<file path=ppt/slides/slide17.xml><?xml version="1.0" encoding="utf-8"?>
+<file path=ppt/slides/slide27.xml><?xml version="1.0" encoding="utf-8"?>
 <p:sld xmlns:a="http://schemas.openxmlformats.org/drawingml/2006/main" xmlns:r="http://schemas.openxmlformats.org/officeDocument/2006/relationships" xmlns:p="http://schemas.openxmlformats.org/presentationml/2006/main">
   <p:cSld>
     <p:spTree>
@@ -15493,7 +18335,7 @@
 </p:sld>
 </file>
 
-<file path=ppt/slides/slide18.xml><?xml version="1.0" encoding="utf-8"?>
+<file path=ppt/slides/slide28.xml><?xml version="1.0" encoding="utf-8"?>
 <p:sld xmlns:a="http://schemas.openxmlformats.org/drawingml/2006/main" xmlns:r="http://schemas.openxmlformats.org/officeDocument/2006/relationships" xmlns:p="http://schemas.openxmlformats.org/presentationml/2006/main">
   <p:cSld>
     <p:spTree>
@@ -15681,7 +18523,7 @@
 </p:sld>
 </file>
 
-<file path=ppt/slides/slide19.xml><?xml version="1.0" encoding="utf-8"?>
+<file path=ppt/slides/slide29.xml><?xml version="1.0" encoding="utf-8"?>
 <p:sld xmlns:a="http://schemas.openxmlformats.org/drawingml/2006/main" xmlns:r="http://schemas.openxmlformats.org/officeDocument/2006/relationships" xmlns:p="http://schemas.openxmlformats.org/presentationml/2006/main">
   <p:cSld>
     <p:spTree>
@@ -15766,130 +18608,6 @@
     <p:extLst>
       <p:ext uri="{BB962C8B-B14F-4D97-AF65-F5344CB8AC3E}">
         <p14:creationId xmlns:p14="http://schemas.microsoft.com/office/powerpoint/2010/main" val="2535739608"/>
-      </p:ext>
-    </p:extLst>
-  </p:cSld>
-  <p:clrMapOvr>
-    <a:masterClrMapping/>
-  </p:clrMapOvr>
-</p:sld>
-</file>
-
-<file path=ppt/slides/slide2.xml><?xml version="1.0" encoding="utf-8"?>
-<p:sld xmlns:a="http://schemas.openxmlformats.org/drawingml/2006/main" xmlns:r="http://schemas.openxmlformats.org/officeDocument/2006/relationships" xmlns:p="http://schemas.openxmlformats.org/presentationml/2006/main">
-  <p:cSld>
-    <p:spTree>
-      <p:nvGrpSpPr>
-        <p:cNvPr id="1" name=""/>
-        <p:cNvGrpSpPr/>
-        <p:nvPr/>
-      </p:nvGrpSpPr>
-      <p:grpSpPr>
-        <a:xfrm>
-          <a:off x="0" y="0"/>
-          <a:ext cx="0" cy="0"/>
-          <a:chOff x="0" y="0"/>
-          <a:chExt cx="0" cy="0"/>
-        </a:xfrm>
-      </p:grpSpPr>
-      <p:sp>
-        <p:nvSpPr>
-          <p:cNvPr id="4" name="TextBox 3">
-            <a:extLst>
-              <a:ext uri="{FF2B5EF4-FFF2-40B4-BE49-F238E27FC236}">
-                <a16:creationId xmlns:a16="http://schemas.microsoft.com/office/drawing/2014/main" id="{B78FD0C1-8AC2-4D62-B2E9-5BF21A2A1358}"/>
-              </a:ext>
-            </a:extLst>
-          </p:cNvPr>
-          <p:cNvSpPr txBox="1"/>
-          <p:nvPr/>
-        </p:nvSpPr>
-        <p:spPr>
-          <a:xfrm>
-            <a:off x="2343705" y="1278384"/>
-            <a:ext cx="7306322" cy="369332"/>
-          </a:xfrm>
-          <a:prstGeom prst="rect">
-            <a:avLst/>
-          </a:prstGeom>
-          <a:noFill/>
-        </p:spPr>
-        <p:txBody>
-          <a:bodyPr wrap="square" rtlCol="0">
-            <a:spAutoFit/>
-          </a:bodyPr>
-          <a:lstStyle/>
-          <a:p>
-            <a:r>
-              <a:rPr lang="en-US">
-                <a:latin typeface="Arial" panose="020B0604020202020204" pitchFamily="34" charset="0"/>
-                <a:cs typeface="Arial" panose="020B0604020202020204" pitchFamily="34" charset="0"/>
-              </a:rPr>
-              <a:t>1. Yêu cầu:</a:t>
-            </a:r>
-          </a:p>
-        </p:txBody>
-      </p:sp>
-      <p:sp>
-        <p:nvSpPr>
-          <p:cNvPr id="5" name="TextBox 4">
-            <a:extLst>
-              <a:ext uri="{FF2B5EF4-FFF2-40B4-BE49-F238E27FC236}">
-                <a16:creationId xmlns:a16="http://schemas.microsoft.com/office/drawing/2014/main" id="{0BF8ED3A-1DDD-4430-BC3C-8DC3392A9DEA}"/>
-              </a:ext>
-            </a:extLst>
-          </p:cNvPr>
-          <p:cNvSpPr txBox="1"/>
-          <p:nvPr/>
-        </p:nvSpPr>
-        <p:spPr>
-          <a:xfrm>
-            <a:off x="2343705" y="2352583"/>
-            <a:ext cx="9430851" cy="923330"/>
-          </a:xfrm>
-          <a:prstGeom prst="rect">
-            <a:avLst/>
-          </a:prstGeom>
-          <a:noFill/>
-        </p:spPr>
-        <p:txBody>
-          <a:bodyPr wrap="none" rtlCol="0">
-            <a:spAutoFit/>
-          </a:bodyPr>
-          <a:lstStyle/>
-          <a:p>
-            <a:r>
-              <a:rPr lang="en-US">
-                <a:latin typeface="Arial" panose="020B0604020202020204" pitchFamily="34" charset="0"/>
-                <a:cs typeface="Arial" panose="020B0604020202020204" pitchFamily="34" charset="0"/>
-              </a:rPr>
-              <a:t>Làm một website học tiếng Anh dành cho lứa tuổi 5-10 tuổi, theo chủ đề gia đình, động vật</a:t>
-            </a:r>
-          </a:p>
-          <a:p>
-            <a:r>
-              <a:rPr lang="en-US">
-                <a:latin typeface="Arial" panose="020B0604020202020204" pitchFamily="34" charset="0"/>
-                <a:cs typeface="Arial" panose="020B0604020202020204" pitchFamily="34" charset="0"/>
-              </a:rPr>
-              <a:t>cây cối.</a:t>
-            </a:r>
-          </a:p>
-          <a:p>
-            <a:r>
-              <a:rPr lang="en-US">
-                <a:latin typeface="Arial" panose="020B0604020202020204" pitchFamily="34" charset="0"/>
-                <a:cs typeface="Arial" panose="020B0604020202020204" pitchFamily="34" charset="0"/>
-              </a:rPr>
-              <a:t>Có các bài học, kèm bài tập nhỏ theo từng bài học và bài tập lớn theo từng chủ đề.</a:t>
-            </a:r>
-          </a:p>
-        </p:txBody>
-      </p:sp>
-    </p:spTree>
-    <p:extLst>
-      <p:ext uri="{BB962C8B-B14F-4D97-AF65-F5344CB8AC3E}">
-        <p14:creationId xmlns:p14="http://schemas.microsoft.com/office/powerpoint/2010/main" val="208499803"/>
       </p:ext>
     </p:extLst>
   </p:cSld>

</xml_diff>